<commit_message>
Alteração no ppt e leiame.
</commit_message>
<xml_diff>
--- a/Aulas/src/main/resources/br/com/orientacaoaobjetos/OrientaçãoAObjetos.pptx
+++ b/Aulas/src/main/resources/br/com/orientacaoaobjetos/OrientaçãoAObjetos.pptx
@@ -5,10 +5,10 @@
     <p:sldMasterId id="2147483648" r:id="rId1"/>
   </p:sldMasterIdLst>
   <p:notesMasterIdLst>
-    <p:notesMasterId r:id="rId16"/>
+    <p:notesMasterId r:id="rId22"/>
   </p:notesMasterIdLst>
   <p:handoutMasterIdLst>
-    <p:handoutMasterId r:id="rId17"/>
+    <p:handoutMasterId r:id="rId23"/>
   </p:handoutMasterIdLst>
   <p:sldIdLst>
     <p:sldId id="257" r:id="rId2"/>
@@ -17,14 +17,20 @@
     <p:sldId id="274" r:id="rId5"/>
     <p:sldId id="275" r:id="rId6"/>
     <p:sldId id="281" r:id="rId7"/>
-    <p:sldId id="282" r:id="rId8"/>
-    <p:sldId id="283" r:id="rId9"/>
-    <p:sldId id="284" r:id="rId10"/>
-    <p:sldId id="285" r:id="rId11"/>
-    <p:sldId id="286" r:id="rId12"/>
-    <p:sldId id="287" r:id="rId13"/>
-    <p:sldId id="279" r:id="rId14"/>
-    <p:sldId id="280" r:id="rId15"/>
+    <p:sldId id="287" r:id="rId8"/>
+    <p:sldId id="288" r:id="rId9"/>
+    <p:sldId id="282" r:id="rId10"/>
+    <p:sldId id="283" r:id="rId11"/>
+    <p:sldId id="284" r:id="rId12"/>
+    <p:sldId id="285" r:id="rId13"/>
+    <p:sldId id="286" r:id="rId14"/>
+    <p:sldId id="289" r:id="rId15"/>
+    <p:sldId id="290" r:id="rId16"/>
+    <p:sldId id="291" r:id="rId17"/>
+    <p:sldId id="292" r:id="rId18"/>
+    <p:sldId id="293" r:id="rId19"/>
+    <p:sldId id="279" r:id="rId20"/>
+    <p:sldId id="280" r:id="rId21"/>
   </p:sldIdLst>
   <p:sldSz cx="9144000" cy="6858000" type="screen4x3"/>
   <p:notesSz cx="6858000" cy="9144000"/>
@@ -791,237 +797,17 @@
           <a:bodyPr/>
           <a:lstStyle/>
           <a:p>
-            <a:pPr marL="0" lvl="0" indent="0">
+            <a:pPr marL="342900" lvl="0" indent="-342900">
               <a:spcBef>
                 <a:spcPct val="20000"/>
               </a:spcBef>
               <a:buFont typeface="Arial"/>
-              <a:buNone/>
+              <a:buChar char="•"/>
               <a:defRPr lang="pt-BR"/>
             </a:pPr>
             <a:r>
               <a:rPr lang="pt-BR" dirty="0"/>
-              <a:t>Mostrar um exemplo ao vivo, para melhor compreensão.</a:t>
-            </a:r>
-          </a:p>
-          <a:p>
-            <a:pPr marL="0" lvl="0" indent="0">
-              <a:spcBef>
-                <a:spcPct val="20000"/>
-              </a:spcBef>
-              <a:buFont typeface="Arial"/>
-              <a:buNone/>
-              <a:defRPr lang="pt-BR"/>
-            </a:pPr>
-            <a:r>
-              <a:rPr lang="pt-BR" dirty="0" err="1"/>
-              <a:t>class</a:t>
-            </a:r>
-            <a:r>
-              <a:rPr lang="pt-BR" dirty="0"/>
-              <a:t> Empregado {</a:t>
-            </a:r>
-          </a:p>
-          <a:p>
-            <a:pPr marL="0" lvl="0" indent="0">
-              <a:spcBef>
-                <a:spcPct val="20000"/>
-              </a:spcBef>
-              <a:buFont typeface="Arial"/>
-              <a:buNone/>
-              <a:defRPr lang="pt-BR"/>
-            </a:pPr>
-            <a:r>
-              <a:rPr lang="pt-BR" dirty="0"/>
-              <a:t>	</a:t>
-            </a:r>
-            <a:r>
-              <a:rPr lang="pt-BR" dirty="0" err="1"/>
-              <a:t>static</a:t>
-            </a:r>
-            <a:r>
-              <a:rPr lang="pt-BR" dirty="0"/>
-              <a:t> </a:t>
-            </a:r>
-            <a:r>
-              <a:rPr lang="pt-BR" dirty="0" err="1"/>
-              <a:t>int</a:t>
-            </a:r>
-            <a:r>
-              <a:rPr lang="pt-BR" dirty="0"/>
-              <a:t> total = 0;</a:t>
-            </a:r>
-          </a:p>
-          <a:p>
-            <a:pPr marL="0" lvl="0" indent="0">
-              <a:spcBef>
-                <a:spcPct val="20000"/>
-              </a:spcBef>
-              <a:buFont typeface="Arial"/>
-              <a:buNone/>
-              <a:defRPr lang="pt-BR"/>
-            </a:pPr>
-            <a:r>
-              <a:rPr lang="pt-BR" dirty="0"/>
-              <a:t>	Empregado () {</a:t>
-            </a:r>
-          </a:p>
-          <a:p>
-            <a:pPr marL="0" lvl="0" indent="0">
-              <a:spcBef>
-                <a:spcPct val="20000"/>
-              </a:spcBef>
-              <a:buFont typeface="Arial"/>
-              <a:buNone/>
-              <a:defRPr lang="pt-BR"/>
-            </a:pPr>
-            <a:r>
-              <a:rPr lang="pt-BR" dirty="0"/>
-              <a:t>		total ++;</a:t>
-            </a:r>
-          </a:p>
-          <a:p>
-            <a:pPr marL="0" lvl="0" indent="0">
-              <a:spcBef>
-                <a:spcPct val="20000"/>
-              </a:spcBef>
-              <a:buFont typeface="Arial"/>
-              <a:buNone/>
-              <a:defRPr lang="pt-BR"/>
-            </a:pPr>
-            <a:r>
-              <a:rPr lang="pt-BR" dirty="0"/>
-              <a:t>		</a:t>
-            </a:r>
-            <a:r>
-              <a:rPr lang="pt-BR" dirty="0" err="1"/>
-              <a:t>System.out.println</a:t>
-            </a:r>
-            <a:r>
-              <a:rPr lang="pt-BR" dirty="0"/>
-              <a:t>(total);</a:t>
-            </a:r>
-          </a:p>
-          <a:p>
-            <a:pPr marL="0" lvl="0" indent="0">
-              <a:spcBef>
-                <a:spcPct val="20000"/>
-              </a:spcBef>
-              <a:buFont typeface="Arial"/>
-              <a:buNone/>
-              <a:defRPr lang="pt-BR"/>
-            </a:pPr>
-            <a:r>
-              <a:rPr lang="pt-BR" dirty="0"/>
-              <a:t>	}</a:t>
-            </a:r>
-          </a:p>
-          <a:p>
-            <a:pPr marL="0" lvl="0" indent="0">
-              <a:spcBef>
-                <a:spcPct val="20000"/>
-              </a:spcBef>
-              <a:buFont typeface="Arial"/>
-              <a:buNone/>
-              <a:defRPr lang="pt-BR"/>
-            </a:pPr>
-            <a:r>
-              <a:rPr lang="pt-BR" dirty="0"/>
-              <a:t>}</a:t>
-            </a:r>
-          </a:p>
-          <a:p>
-            <a:pPr marL="0" lvl="0" indent="0">
-              <a:spcBef>
-                <a:spcPct val="20000"/>
-              </a:spcBef>
-              <a:buFont typeface="Arial"/>
-              <a:buNone/>
-              <a:defRPr lang="pt-BR"/>
-            </a:pPr>
-            <a:r>
-              <a:rPr lang="pt-BR" dirty="0"/>
-              <a:t>Teste: </a:t>
-            </a:r>
-          </a:p>
-          <a:p>
-            <a:pPr marL="0" lvl="0" indent="0">
-              <a:spcBef>
-                <a:spcPct val="20000"/>
-              </a:spcBef>
-              <a:buFont typeface="Arial"/>
-              <a:buNone/>
-              <a:defRPr lang="pt-BR"/>
-            </a:pPr>
-            <a:r>
-              <a:rPr lang="pt-BR" dirty="0"/>
-              <a:t>Empregado empregado1 = new Empregado(); // irá imprimir 1</a:t>
-            </a:r>
-          </a:p>
-          <a:p>
-            <a:pPr marL="0" marR="0" lvl="0" indent="0" algn="l" defTabSz="914400" rtl="0" eaLnBrk="1" fontAlgn="auto" latinLnBrk="0" hangingPunct="1">
-              <a:lnSpc>
-                <a:spcPct val="100000"/>
-              </a:lnSpc>
-              <a:spcBef>
-                <a:spcPct val="20000"/>
-              </a:spcBef>
-              <a:spcAft>
-                <a:spcPts val="0"/>
-              </a:spcAft>
-              <a:buClrTx/>
-              <a:buSzTx/>
-              <a:buFont typeface="Arial"/>
-              <a:buNone/>
-              <a:tabLst/>
-              <a:defRPr lang="pt-BR"/>
-            </a:pPr>
-            <a:r>
-              <a:rPr lang="pt-BR" dirty="0"/>
-              <a:t>Empregado empregado2 = new Empregado(); // irá imprimir 2</a:t>
-            </a:r>
-          </a:p>
-          <a:p>
-            <a:pPr marL="0" marR="0" lvl="0" indent="0" algn="l" defTabSz="914400" rtl="0" eaLnBrk="1" fontAlgn="auto" latinLnBrk="0" hangingPunct="1">
-              <a:lnSpc>
-                <a:spcPct val="100000"/>
-              </a:lnSpc>
-              <a:spcBef>
-                <a:spcPct val="20000"/>
-              </a:spcBef>
-              <a:spcAft>
-                <a:spcPts val="0"/>
-              </a:spcAft>
-              <a:buClrTx/>
-              <a:buSzTx/>
-              <a:buFont typeface="Arial"/>
-              <a:buNone/>
-              <a:tabLst/>
-              <a:defRPr lang="pt-BR"/>
-            </a:pPr>
-            <a:endParaRPr lang="pt-BR" dirty="0"/>
-          </a:p>
-          <a:p>
-            <a:pPr marL="0" marR="0" lvl="0" indent="0" algn="l" defTabSz="914400" rtl="0" eaLnBrk="1" fontAlgn="auto" latinLnBrk="0" hangingPunct="1">
-              <a:lnSpc>
-                <a:spcPct val="100000"/>
-              </a:lnSpc>
-              <a:spcBef>
-                <a:spcPct val="20000"/>
-              </a:spcBef>
-              <a:spcAft>
-                <a:spcPts val="0"/>
-              </a:spcAft>
-              <a:buClrTx/>
-              <a:buSzTx/>
-              <a:buFont typeface="Arial"/>
-              <a:buNone/>
-              <a:tabLst/>
-              <a:defRPr lang="pt-BR"/>
-            </a:pPr>
-            <a:r>
-              <a:rPr lang="pt-BR" dirty="0"/>
-              <a:t>Obs. Ao criar empregado, é utilizado a mesma instância da variável que foi alterado pelo objeto anterior.</a:t>
+              <a:t>O método que será executado vai depender dos parâmetros passados.</a:t>
             </a:r>
           </a:p>
           <a:p>
@@ -1035,6 +821,20 @@
             </a:pPr>
             <a:endParaRPr lang="pt-BR" dirty="0"/>
           </a:p>
+          <a:p>
+            <a:pPr marL="0" lvl="0" indent="0">
+              <a:spcBef>
+                <a:spcPct val="20000"/>
+              </a:spcBef>
+              <a:buFont typeface="Arial"/>
+              <a:buNone/>
+              <a:defRPr lang="pt-BR"/>
+            </a:pPr>
+            <a:r>
+              <a:rPr lang="pt-BR" dirty="0"/>
+              <a:t>Também existe a sobrecarga de construtores.</a:t>
+            </a:r>
+          </a:p>
         </p:txBody>
       </p:sp>
       <p:sp>
@@ -1064,7 +864,7 @@
     </p:spTree>
     <p:extLst>
       <p:ext uri="{BB962C8B-B14F-4D97-AF65-F5344CB8AC3E}">
-        <p14:creationId xmlns:p14="http://schemas.microsoft.com/office/powerpoint/2010/main" val="2901294821"/>
+        <p14:creationId xmlns:p14="http://schemas.microsoft.com/office/powerpoint/2010/main" val="4168105884"/>
       </p:ext>
     </p:extLst>
   </p:cSld>
@@ -1128,16 +928,239 @@
             </a:pPr>
             <a:r>
               <a:rPr lang="pt-BR" dirty="0"/>
-              <a:t>Mostrar na prática como funciona método estático, usando </a:t>
-            </a:r>
+              <a:t>Mostrar um exemplo ao vivo, para melhor compreensão.</a:t>
+            </a:r>
+          </a:p>
+          <a:p>
+            <a:pPr marL="0" lvl="0" indent="0">
+              <a:spcBef>
+                <a:spcPct val="20000"/>
+              </a:spcBef>
+              <a:buFont typeface="Arial"/>
+              <a:buNone/>
+              <a:defRPr lang="pt-BR"/>
+            </a:pPr>
             <a:r>
               <a:rPr lang="pt-BR" dirty="0" err="1"/>
-              <a:t>Utils</a:t>
+              <a:t>class</a:t>
             </a:r>
             <a:r>
               <a:rPr lang="pt-BR" dirty="0"/>
-              <a:t> como exemplo.</a:t>
-            </a:r>
+              <a:t> Empregado {</a:t>
+            </a:r>
+          </a:p>
+          <a:p>
+            <a:pPr marL="0" lvl="0" indent="0">
+              <a:spcBef>
+                <a:spcPct val="20000"/>
+              </a:spcBef>
+              <a:buFont typeface="Arial"/>
+              <a:buNone/>
+              <a:defRPr lang="pt-BR"/>
+            </a:pPr>
+            <a:r>
+              <a:rPr lang="pt-BR" dirty="0"/>
+              <a:t>	</a:t>
+            </a:r>
+            <a:r>
+              <a:rPr lang="pt-BR" dirty="0" err="1"/>
+              <a:t>static</a:t>
+            </a:r>
+            <a:r>
+              <a:rPr lang="pt-BR" dirty="0"/>
+              <a:t> </a:t>
+            </a:r>
+            <a:r>
+              <a:rPr lang="pt-BR" dirty="0" err="1"/>
+              <a:t>int</a:t>
+            </a:r>
+            <a:r>
+              <a:rPr lang="pt-BR" dirty="0"/>
+              <a:t> total = 0;</a:t>
+            </a:r>
+          </a:p>
+          <a:p>
+            <a:pPr marL="0" lvl="0" indent="0">
+              <a:spcBef>
+                <a:spcPct val="20000"/>
+              </a:spcBef>
+              <a:buFont typeface="Arial"/>
+              <a:buNone/>
+              <a:defRPr lang="pt-BR"/>
+            </a:pPr>
+            <a:r>
+              <a:rPr lang="pt-BR" dirty="0"/>
+              <a:t>	Empregado () {</a:t>
+            </a:r>
+          </a:p>
+          <a:p>
+            <a:pPr marL="0" lvl="0" indent="0">
+              <a:spcBef>
+                <a:spcPct val="20000"/>
+              </a:spcBef>
+              <a:buFont typeface="Arial"/>
+              <a:buNone/>
+              <a:defRPr lang="pt-BR"/>
+            </a:pPr>
+            <a:r>
+              <a:rPr lang="pt-BR" dirty="0"/>
+              <a:t>		total ++;</a:t>
+            </a:r>
+          </a:p>
+          <a:p>
+            <a:pPr marL="0" lvl="0" indent="0">
+              <a:spcBef>
+                <a:spcPct val="20000"/>
+              </a:spcBef>
+              <a:buFont typeface="Arial"/>
+              <a:buNone/>
+              <a:defRPr lang="pt-BR"/>
+            </a:pPr>
+            <a:r>
+              <a:rPr lang="pt-BR" dirty="0"/>
+              <a:t>		</a:t>
+            </a:r>
+            <a:r>
+              <a:rPr lang="pt-BR" dirty="0" err="1"/>
+              <a:t>System.out.println</a:t>
+            </a:r>
+            <a:r>
+              <a:rPr lang="pt-BR" dirty="0"/>
+              <a:t>(total);</a:t>
+            </a:r>
+          </a:p>
+          <a:p>
+            <a:pPr marL="0" lvl="0" indent="0">
+              <a:spcBef>
+                <a:spcPct val="20000"/>
+              </a:spcBef>
+              <a:buFont typeface="Arial"/>
+              <a:buNone/>
+              <a:defRPr lang="pt-BR"/>
+            </a:pPr>
+            <a:r>
+              <a:rPr lang="pt-BR" dirty="0"/>
+              <a:t>	}</a:t>
+            </a:r>
+          </a:p>
+          <a:p>
+            <a:pPr marL="0" lvl="0" indent="0">
+              <a:spcBef>
+                <a:spcPct val="20000"/>
+              </a:spcBef>
+              <a:buFont typeface="Arial"/>
+              <a:buNone/>
+              <a:defRPr lang="pt-BR"/>
+            </a:pPr>
+            <a:r>
+              <a:rPr lang="pt-BR" dirty="0"/>
+              <a:t>}</a:t>
+            </a:r>
+          </a:p>
+          <a:p>
+            <a:pPr marL="0" lvl="0" indent="0">
+              <a:spcBef>
+                <a:spcPct val="20000"/>
+              </a:spcBef>
+              <a:buFont typeface="Arial"/>
+              <a:buNone/>
+              <a:defRPr lang="pt-BR"/>
+            </a:pPr>
+            <a:r>
+              <a:rPr lang="pt-BR" dirty="0"/>
+              <a:t>Teste: </a:t>
+            </a:r>
+          </a:p>
+          <a:p>
+            <a:pPr marL="0" lvl="0" indent="0">
+              <a:spcBef>
+                <a:spcPct val="20000"/>
+              </a:spcBef>
+              <a:buFont typeface="Arial"/>
+              <a:buNone/>
+              <a:defRPr lang="pt-BR"/>
+            </a:pPr>
+            <a:r>
+              <a:rPr lang="pt-BR" dirty="0"/>
+              <a:t>Empregado empregado1 = new Empregado(); // irá imprimir 1</a:t>
+            </a:r>
+          </a:p>
+          <a:p>
+            <a:pPr marL="0" marR="0" lvl="0" indent="0" algn="l" defTabSz="914400" rtl="0" eaLnBrk="1" fontAlgn="auto" latinLnBrk="0" hangingPunct="1">
+              <a:lnSpc>
+                <a:spcPct val="100000"/>
+              </a:lnSpc>
+              <a:spcBef>
+                <a:spcPct val="20000"/>
+              </a:spcBef>
+              <a:spcAft>
+                <a:spcPts val="0"/>
+              </a:spcAft>
+              <a:buClrTx/>
+              <a:buSzTx/>
+              <a:buFont typeface="Arial"/>
+              <a:buNone/>
+              <a:tabLst/>
+              <a:defRPr lang="pt-BR"/>
+            </a:pPr>
+            <a:r>
+              <a:rPr lang="pt-BR" dirty="0"/>
+              <a:t>Empregado empregado2 = new Empregado(); // irá imprimir 2</a:t>
+            </a:r>
+          </a:p>
+          <a:p>
+            <a:pPr marL="0" marR="0" lvl="0" indent="0" algn="l" defTabSz="914400" rtl="0" eaLnBrk="1" fontAlgn="auto" latinLnBrk="0" hangingPunct="1">
+              <a:lnSpc>
+                <a:spcPct val="100000"/>
+              </a:lnSpc>
+              <a:spcBef>
+                <a:spcPct val="20000"/>
+              </a:spcBef>
+              <a:spcAft>
+                <a:spcPts val="0"/>
+              </a:spcAft>
+              <a:buClrTx/>
+              <a:buSzTx/>
+              <a:buFont typeface="Arial"/>
+              <a:buNone/>
+              <a:tabLst/>
+              <a:defRPr lang="pt-BR"/>
+            </a:pPr>
+            <a:endParaRPr lang="pt-BR" dirty="0"/>
+          </a:p>
+          <a:p>
+            <a:pPr marL="0" marR="0" lvl="0" indent="0" algn="l" defTabSz="914400" rtl="0" eaLnBrk="1" fontAlgn="auto" latinLnBrk="0" hangingPunct="1">
+              <a:lnSpc>
+                <a:spcPct val="100000"/>
+              </a:lnSpc>
+              <a:spcBef>
+                <a:spcPct val="20000"/>
+              </a:spcBef>
+              <a:spcAft>
+                <a:spcPts val="0"/>
+              </a:spcAft>
+              <a:buClrTx/>
+              <a:buSzTx/>
+              <a:buFont typeface="Arial"/>
+              <a:buNone/>
+              <a:tabLst/>
+              <a:defRPr lang="pt-BR"/>
+            </a:pPr>
+            <a:r>
+              <a:rPr lang="pt-BR" dirty="0"/>
+              <a:t>Obs. Ao criar empregado, é utilizado a mesma instância da variável que foi alterado pelo objeto anterior.</a:t>
+            </a:r>
+          </a:p>
+          <a:p>
+            <a:pPr marL="0" lvl="0" indent="0">
+              <a:spcBef>
+                <a:spcPct val="20000"/>
+              </a:spcBef>
+              <a:buFont typeface="Arial"/>
+              <a:buNone/>
+              <a:defRPr lang="pt-BR"/>
+            </a:pPr>
+            <a:endParaRPr lang="pt-BR" dirty="0"/>
           </a:p>
         </p:txBody>
       </p:sp>
@@ -1168,7 +1191,7 @@
     </p:spTree>
     <p:extLst>
       <p:ext uri="{BB962C8B-B14F-4D97-AF65-F5344CB8AC3E}">
-        <p14:creationId xmlns:p14="http://schemas.microsoft.com/office/powerpoint/2010/main" val="1807363513"/>
+        <p14:creationId xmlns:p14="http://schemas.microsoft.com/office/powerpoint/2010/main" val="398612483"/>
       </p:ext>
     </p:extLst>
   </p:cSld>
@@ -1232,16 +1255,239 @@
             </a:pPr>
             <a:r>
               <a:rPr lang="pt-BR" dirty="0"/>
-              <a:t>Mostrar na prática como funciona método estático, usando </a:t>
-            </a:r>
+              <a:t>Mostrar um exemplo ao vivo, para melhor compreensão.</a:t>
+            </a:r>
+          </a:p>
+          <a:p>
+            <a:pPr marL="0" lvl="0" indent="0">
+              <a:spcBef>
+                <a:spcPct val="20000"/>
+              </a:spcBef>
+              <a:buFont typeface="Arial"/>
+              <a:buNone/>
+              <a:defRPr lang="pt-BR"/>
+            </a:pPr>
             <a:r>
               <a:rPr lang="pt-BR" dirty="0" err="1"/>
-              <a:t>Utils</a:t>
+              <a:t>class</a:t>
             </a:r>
             <a:r>
               <a:rPr lang="pt-BR" dirty="0"/>
-              <a:t> como exemplo.</a:t>
-            </a:r>
+              <a:t> Empregado {</a:t>
+            </a:r>
+          </a:p>
+          <a:p>
+            <a:pPr marL="0" lvl="0" indent="0">
+              <a:spcBef>
+                <a:spcPct val="20000"/>
+              </a:spcBef>
+              <a:buFont typeface="Arial"/>
+              <a:buNone/>
+              <a:defRPr lang="pt-BR"/>
+            </a:pPr>
+            <a:r>
+              <a:rPr lang="pt-BR" dirty="0"/>
+              <a:t>	</a:t>
+            </a:r>
+            <a:r>
+              <a:rPr lang="pt-BR" dirty="0" err="1"/>
+              <a:t>static</a:t>
+            </a:r>
+            <a:r>
+              <a:rPr lang="pt-BR" dirty="0"/>
+              <a:t> </a:t>
+            </a:r>
+            <a:r>
+              <a:rPr lang="pt-BR" dirty="0" err="1"/>
+              <a:t>int</a:t>
+            </a:r>
+            <a:r>
+              <a:rPr lang="pt-BR" dirty="0"/>
+              <a:t> total = 0;</a:t>
+            </a:r>
+          </a:p>
+          <a:p>
+            <a:pPr marL="0" lvl="0" indent="0">
+              <a:spcBef>
+                <a:spcPct val="20000"/>
+              </a:spcBef>
+              <a:buFont typeface="Arial"/>
+              <a:buNone/>
+              <a:defRPr lang="pt-BR"/>
+            </a:pPr>
+            <a:r>
+              <a:rPr lang="pt-BR" dirty="0"/>
+              <a:t>	Empregado () {</a:t>
+            </a:r>
+          </a:p>
+          <a:p>
+            <a:pPr marL="0" lvl="0" indent="0">
+              <a:spcBef>
+                <a:spcPct val="20000"/>
+              </a:spcBef>
+              <a:buFont typeface="Arial"/>
+              <a:buNone/>
+              <a:defRPr lang="pt-BR"/>
+            </a:pPr>
+            <a:r>
+              <a:rPr lang="pt-BR" dirty="0"/>
+              <a:t>		total ++;</a:t>
+            </a:r>
+          </a:p>
+          <a:p>
+            <a:pPr marL="0" lvl="0" indent="0">
+              <a:spcBef>
+                <a:spcPct val="20000"/>
+              </a:spcBef>
+              <a:buFont typeface="Arial"/>
+              <a:buNone/>
+              <a:defRPr lang="pt-BR"/>
+            </a:pPr>
+            <a:r>
+              <a:rPr lang="pt-BR" dirty="0"/>
+              <a:t>		</a:t>
+            </a:r>
+            <a:r>
+              <a:rPr lang="pt-BR" dirty="0" err="1"/>
+              <a:t>System.out.println</a:t>
+            </a:r>
+            <a:r>
+              <a:rPr lang="pt-BR" dirty="0"/>
+              <a:t>(total);</a:t>
+            </a:r>
+          </a:p>
+          <a:p>
+            <a:pPr marL="0" lvl="0" indent="0">
+              <a:spcBef>
+                <a:spcPct val="20000"/>
+              </a:spcBef>
+              <a:buFont typeface="Arial"/>
+              <a:buNone/>
+              <a:defRPr lang="pt-BR"/>
+            </a:pPr>
+            <a:r>
+              <a:rPr lang="pt-BR" dirty="0"/>
+              <a:t>	}</a:t>
+            </a:r>
+          </a:p>
+          <a:p>
+            <a:pPr marL="0" lvl="0" indent="0">
+              <a:spcBef>
+                <a:spcPct val="20000"/>
+              </a:spcBef>
+              <a:buFont typeface="Arial"/>
+              <a:buNone/>
+              <a:defRPr lang="pt-BR"/>
+            </a:pPr>
+            <a:r>
+              <a:rPr lang="pt-BR" dirty="0"/>
+              <a:t>}</a:t>
+            </a:r>
+          </a:p>
+          <a:p>
+            <a:pPr marL="0" lvl="0" indent="0">
+              <a:spcBef>
+                <a:spcPct val="20000"/>
+              </a:spcBef>
+              <a:buFont typeface="Arial"/>
+              <a:buNone/>
+              <a:defRPr lang="pt-BR"/>
+            </a:pPr>
+            <a:r>
+              <a:rPr lang="pt-BR" dirty="0"/>
+              <a:t>Teste: </a:t>
+            </a:r>
+          </a:p>
+          <a:p>
+            <a:pPr marL="0" lvl="0" indent="0">
+              <a:spcBef>
+                <a:spcPct val="20000"/>
+              </a:spcBef>
+              <a:buFont typeface="Arial"/>
+              <a:buNone/>
+              <a:defRPr lang="pt-BR"/>
+            </a:pPr>
+            <a:r>
+              <a:rPr lang="pt-BR" dirty="0"/>
+              <a:t>Empregado empregado1 = new Empregado(); // irá imprimir 1</a:t>
+            </a:r>
+          </a:p>
+          <a:p>
+            <a:pPr marL="0" marR="0" lvl="0" indent="0" algn="l" defTabSz="914400" rtl="0" eaLnBrk="1" fontAlgn="auto" latinLnBrk="0" hangingPunct="1">
+              <a:lnSpc>
+                <a:spcPct val="100000"/>
+              </a:lnSpc>
+              <a:spcBef>
+                <a:spcPct val="20000"/>
+              </a:spcBef>
+              <a:spcAft>
+                <a:spcPts val="0"/>
+              </a:spcAft>
+              <a:buClrTx/>
+              <a:buSzTx/>
+              <a:buFont typeface="Arial"/>
+              <a:buNone/>
+              <a:tabLst/>
+              <a:defRPr lang="pt-BR"/>
+            </a:pPr>
+            <a:r>
+              <a:rPr lang="pt-BR" dirty="0"/>
+              <a:t>Empregado empregado2 = new Empregado(); // irá imprimir 2</a:t>
+            </a:r>
+          </a:p>
+          <a:p>
+            <a:pPr marL="0" marR="0" lvl="0" indent="0" algn="l" defTabSz="914400" rtl="0" eaLnBrk="1" fontAlgn="auto" latinLnBrk="0" hangingPunct="1">
+              <a:lnSpc>
+                <a:spcPct val="100000"/>
+              </a:lnSpc>
+              <a:spcBef>
+                <a:spcPct val="20000"/>
+              </a:spcBef>
+              <a:spcAft>
+                <a:spcPts val="0"/>
+              </a:spcAft>
+              <a:buClrTx/>
+              <a:buSzTx/>
+              <a:buFont typeface="Arial"/>
+              <a:buNone/>
+              <a:tabLst/>
+              <a:defRPr lang="pt-BR"/>
+            </a:pPr>
+            <a:endParaRPr lang="pt-BR" dirty="0"/>
+          </a:p>
+          <a:p>
+            <a:pPr marL="0" marR="0" lvl="0" indent="0" algn="l" defTabSz="914400" rtl="0" eaLnBrk="1" fontAlgn="auto" latinLnBrk="0" hangingPunct="1">
+              <a:lnSpc>
+                <a:spcPct val="100000"/>
+              </a:lnSpc>
+              <a:spcBef>
+                <a:spcPct val="20000"/>
+              </a:spcBef>
+              <a:spcAft>
+                <a:spcPts val="0"/>
+              </a:spcAft>
+              <a:buClrTx/>
+              <a:buSzTx/>
+              <a:buFont typeface="Arial"/>
+              <a:buNone/>
+              <a:tabLst/>
+              <a:defRPr lang="pt-BR"/>
+            </a:pPr>
+            <a:r>
+              <a:rPr lang="pt-BR" dirty="0"/>
+              <a:t>Obs. Ao criar empregado, é utilizado a mesma instância da variável que foi alterado pelo objeto anterior.</a:t>
+            </a:r>
+          </a:p>
+          <a:p>
+            <a:pPr marL="0" lvl="0" indent="0">
+              <a:spcBef>
+                <a:spcPct val="20000"/>
+              </a:spcBef>
+              <a:buFont typeface="Arial"/>
+              <a:buNone/>
+              <a:defRPr lang="pt-BR"/>
+            </a:pPr>
+            <a:endParaRPr lang="pt-BR" dirty="0"/>
           </a:p>
         </p:txBody>
       </p:sp>
@@ -1272,7 +1518,7 @@
     </p:spTree>
     <p:extLst>
       <p:ext uri="{BB962C8B-B14F-4D97-AF65-F5344CB8AC3E}">
-        <p14:creationId xmlns:p14="http://schemas.microsoft.com/office/powerpoint/2010/main" val="3170970398"/>
+        <p14:creationId xmlns:p14="http://schemas.microsoft.com/office/powerpoint/2010/main" val="2901294821"/>
       </p:ext>
     </p:extLst>
   </p:cSld>
@@ -1326,65 +1572,26 @@
           <a:bodyPr/>
           <a:lstStyle/>
           <a:p>
-            <a:pPr marL="342900" lvl="0" indent="-342900">
+            <a:pPr marL="0" lvl="0" indent="0">
               <a:spcBef>
                 <a:spcPct val="20000"/>
               </a:spcBef>
               <a:buFont typeface="Arial"/>
-              <a:buChar char="•"/>
+              <a:buNone/>
               <a:defRPr lang="pt-BR"/>
             </a:pPr>
             <a:r>
-              <a:rPr lang="pt-BR" sz="1200" kern="0" dirty="0"/>
-              <a:t>01 - break: Encerra o loop e sai do escopo.</a:t>
-            </a:r>
-          </a:p>
-          <a:p>
-            <a:pPr marL="342900" lvl="0" indent="-342900">
-              <a:spcBef>
-                <a:spcPct val="20000"/>
-              </a:spcBef>
-              <a:buFont typeface="Arial"/>
-              <a:buChar char="•"/>
-              <a:defRPr lang="pt-BR"/>
-            </a:pPr>
-            <a:r>
               <a:rPr lang="pt-BR" dirty="0"/>
-              <a:t>02 - continue: Quando encontrado, encerra a interação e segue para a próxima interação.</a:t>
-            </a:r>
-          </a:p>
-          <a:p>
-            <a:pPr marL="342900" lvl="0" indent="-342900">
-              <a:spcBef>
-                <a:spcPct val="20000"/>
-              </a:spcBef>
-              <a:buFont typeface="Arial"/>
-              <a:buChar char="•"/>
-              <a:defRPr lang="pt-BR"/>
-            </a:pPr>
+              <a:t>Mostrar na prática como funciona método estático, usando </a:t>
+            </a:r>
+            <a:r>
+              <a:rPr lang="pt-BR" dirty="0" err="1"/>
+              <a:t>Utils</a:t>
+            </a:r>
             <a:r>
               <a:rPr lang="pt-BR" dirty="0"/>
-              <a:t>03 - </a:t>
-            </a:r>
-            <a:r>
-              <a:rPr lang="pt-BR" dirty="0" err="1"/>
-              <a:t>return</a:t>
-            </a:r>
-            <a:r>
-              <a:rPr lang="pt-BR" dirty="0"/>
-              <a:t>: Utilizada para sair de um método. (Está fora do contexto da estrutura de repetição)</a:t>
-            </a:r>
-          </a:p>
-          <a:p>
-            <a:pPr marL="342900" lvl="0" indent="-342900">
-              <a:spcBef>
-                <a:spcPct val="20000"/>
-              </a:spcBef>
-              <a:buFont typeface="Arial"/>
-              <a:buChar char="•"/>
-              <a:defRPr lang="pt-BR"/>
-            </a:pPr>
-            <a:endParaRPr lang="pt-BR" dirty="0"/>
+              <a:t> como exemplo.</a:t>
+            </a:r>
           </a:p>
         </p:txBody>
       </p:sp>
@@ -1413,6 +1620,11 @@
         </p:txBody>
       </p:sp>
     </p:spTree>
+    <p:extLst>
+      <p:ext uri="{BB962C8B-B14F-4D97-AF65-F5344CB8AC3E}">
+        <p14:creationId xmlns:p14="http://schemas.microsoft.com/office/powerpoint/2010/main" val="1807363513"/>
+      </p:ext>
+    </p:extLst>
   </p:cSld>
   <p:clrMapOvr>
     <a:masterClrMapping/>
@@ -1464,6 +1676,471 @@
           <a:bodyPr/>
           <a:lstStyle/>
           <a:p>
+            <a:pPr marL="0" lvl="0" indent="0">
+              <a:spcBef>
+                <a:spcPct val="20000"/>
+              </a:spcBef>
+              <a:buFont typeface="Arial"/>
+              <a:buNone/>
+              <a:defRPr lang="pt-BR"/>
+            </a:pPr>
+            <a:endParaRPr lang="pt-BR" dirty="0"/>
+          </a:p>
+        </p:txBody>
+      </p:sp>
+      <p:sp>
+        <p:nvSpPr>
+          <p:cNvPr id="4" name="Rectangle 4"/>
+          <p:cNvSpPr>
+            <a:spLocks noGrp="1"/>
+          </p:cNvSpPr>
+          <p:nvPr>
+            <p:ph type="sldNum" sz="quarter" idx="10"/>
+          </p:nvPr>
+        </p:nvSpPr>
+        <p:spPr/>
+        <p:txBody>
+          <a:bodyPr/>
+          <a:lstStyle/>
+          <a:p>
+            <a:fld id="{61807874-5299-41B2-A37A-6AA3547857F4}" type="slidenum">
+              <a:rPr lang="pt-BR" smtClean="0"/>
+              <a:pPr/>
+              <a:t>14</a:t>
+            </a:fld>
+            <a:endParaRPr lang="pt-BR"/>
+          </a:p>
+        </p:txBody>
+      </p:sp>
+    </p:spTree>
+    <p:extLst>
+      <p:ext uri="{BB962C8B-B14F-4D97-AF65-F5344CB8AC3E}">
+        <p14:creationId xmlns:p14="http://schemas.microsoft.com/office/powerpoint/2010/main" val="1169243822"/>
+      </p:ext>
+    </p:extLst>
+  </p:cSld>
+  <p:clrMapOvr>
+    <a:masterClrMapping/>
+  </p:clrMapOvr>
+</p:notes>
+</file>
+
+<file path=ppt/notesSlides/notesSlide15.xml><?xml version="1.0" encoding="utf-8"?>
+<p:notes xmlns:a="http://schemas.openxmlformats.org/drawingml/2006/main" xmlns:r="http://schemas.openxmlformats.org/officeDocument/2006/relationships" xmlns:p="http://schemas.openxmlformats.org/presentationml/2006/main">
+  <p:cSld>
+    <p:spTree>
+      <p:nvGrpSpPr>
+        <p:cNvPr id="1" name=""/>
+        <p:cNvGrpSpPr/>
+        <p:nvPr/>
+      </p:nvGrpSpPr>
+      <p:grpSpPr>
+        <a:xfrm>
+          <a:off x="0" y="0"/>
+          <a:ext cx="0" cy="0"/>
+          <a:chOff x="0" y="0"/>
+          <a:chExt cx="0" cy="0"/>
+        </a:xfrm>
+      </p:grpSpPr>
+      <p:sp>
+        <p:nvSpPr>
+          <p:cNvPr id="2" name="Rectangle 2"/>
+          <p:cNvSpPr>
+            <a:spLocks noGrp="1" noRot="1" noChangeAspect="1"/>
+          </p:cNvSpPr>
+          <p:nvPr>
+            <p:ph type="sldImg"/>
+          </p:nvPr>
+        </p:nvSpPr>
+        <p:spPr/>
+      </p:sp>
+      <p:sp>
+        <p:nvSpPr>
+          <p:cNvPr id="3" name="Rectangle 3"/>
+          <p:cNvSpPr>
+            <a:spLocks noGrp="1"/>
+          </p:cNvSpPr>
+          <p:nvPr>
+            <p:ph type="body" idx="1"/>
+          </p:nvPr>
+        </p:nvSpPr>
+        <p:spPr/>
+        <p:txBody>
+          <a:bodyPr/>
+          <a:lstStyle/>
+          <a:p>
+            <a:pPr marL="0" lvl="0" indent="0">
+              <a:spcBef>
+                <a:spcPct val="20000"/>
+              </a:spcBef>
+              <a:buFont typeface="Arial"/>
+              <a:buNone/>
+              <a:defRPr lang="pt-BR"/>
+            </a:pPr>
+            <a:endParaRPr lang="pt-BR" dirty="0"/>
+          </a:p>
+        </p:txBody>
+      </p:sp>
+      <p:sp>
+        <p:nvSpPr>
+          <p:cNvPr id="4" name="Rectangle 4"/>
+          <p:cNvSpPr>
+            <a:spLocks noGrp="1"/>
+          </p:cNvSpPr>
+          <p:nvPr>
+            <p:ph type="sldNum" sz="quarter" idx="10"/>
+          </p:nvPr>
+        </p:nvSpPr>
+        <p:spPr/>
+        <p:txBody>
+          <a:bodyPr/>
+          <a:lstStyle/>
+          <a:p>
+            <a:fld id="{61807874-5299-41B2-A37A-6AA3547857F4}" type="slidenum">
+              <a:rPr lang="pt-BR" smtClean="0"/>
+              <a:pPr/>
+              <a:t>15</a:t>
+            </a:fld>
+            <a:endParaRPr lang="pt-BR"/>
+          </a:p>
+        </p:txBody>
+      </p:sp>
+    </p:spTree>
+    <p:extLst>
+      <p:ext uri="{BB962C8B-B14F-4D97-AF65-F5344CB8AC3E}">
+        <p14:creationId xmlns:p14="http://schemas.microsoft.com/office/powerpoint/2010/main" val="484260518"/>
+      </p:ext>
+    </p:extLst>
+  </p:cSld>
+  <p:clrMapOvr>
+    <a:masterClrMapping/>
+  </p:clrMapOvr>
+</p:notes>
+</file>
+
+<file path=ppt/notesSlides/notesSlide16.xml><?xml version="1.0" encoding="utf-8"?>
+<p:notes xmlns:a="http://schemas.openxmlformats.org/drawingml/2006/main" xmlns:r="http://schemas.openxmlformats.org/officeDocument/2006/relationships" xmlns:p="http://schemas.openxmlformats.org/presentationml/2006/main">
+  <p:cSld>
+    <p:spTree>
+      <p:nvGrpSpPr>
+        <p:cNvPr id="1" name=""/>
+        <p:cNvGrpSpPr/>
+        <p:nvPr/>
+      </p:nvGrpSpPr>
+      <p:grpSpPr>
+        <a:xfrm>
+          <a:off x="0" y="0"/>
+          <a:ext cx="0" cy="0"/>
+          <a:chOff x="0" y="0"/>
+          <a:chExt cx="0" cy="0"/>
+        </a:xfrm>
+      </p:grpSpPr>
+      <p:sp>
+        <p:nvSpPr>
+          <p:cNvPr id="2" name="Rectangle 2"/>
+          <p:cNvSpPr>
+            <a:spLocks noGrp="1" noRot="1" noChangeAspect="1"/>
+          </p:cNvSpPr>
+          <p:nvPr>
+            <p:ph type="sldImg"/>
+          </p:nvPr>
+        </p:nvSpPr>
+        <p:spPr/>
+      </p:sp>
+      <p:sp>
+        <p:nvSpPr>
+          <p:cNvPr id="3" name="Rectangle 3"/>
+          <p:cNvSpPr>
+            <a:spLocks noGrp="1"/>
+          </p:cNvSpPr>
+          <p:nvPr>
+            <p:ph type="body" idx="1"/>
+          </p:nvPr>
+        </p:nvSpPr>
+        <p:spPr/>
+        <p:txBody>
+          <a:bodyPr/>
+          <a:lstStyle/>
+          <a:p>
+            <a:pPr marL="0" lvl="0" indent="0">
+              <a:spcBef>
+                <a:spcPct val="20000"/>
+              </a:spcBef>
+              <a:buFont typeface="Arial"/>
+              <a:buNone/>
+              <a:defRPr lang="pt-BR"/>
+            </a:pPr>
+            <a:endParaRPr lang="pt-BR" dirty="0"/>
+          </a:p>
+        </p:txBody>
+      </p:sp>
+      <p:sp>
+        <p:nvSpPr>
+          <p:cNvPr id="4" name="Rectangle 4"/>
+          <p:cNvSpPr>
+            <a:spLocks noGrp="1"/>
+          </p:cNvSpPr>
+          <p:nvPr>
+            <p:ph type="sldNum" sz="quarter" idx="10"/>
+          </p:nvPr>
+        </p:nvSpPr>
+        <p:spPr/>
+        <p:txBody>
+          <a:bodyPr/>
+          <a:lstStyle/>
+          <a:p>
+            <a:fld id="{61807874-5299-41B2-A37A-6AA3547857F4}" type="slidenum">
+              <a:rPr lang="pt-BR" smtClean="0"/>
+              <a:pPr/>
+              <a:t>16</a:t>
+            </a:fld>
+            <a:endParaRPr lang="pt-BR"/>
+          </a:p>
+        </p:txBody>
+      </p:sp>
+    </p:spTree>
+    <p:extLst>
+      <p:ext uri="{BB962C8B-B14F-4D97-AF65-F5344CB8AC3E}">
+        <p14:creationId xmlns:p14="http://schemas.microsoft.com/office/powerpoint/2010/main" val="1329859241"/>
+      </p:ext>
+    </p:extLst>
+  </p:cSld>
+  <p:clrMapOvr>
+    <a:masterClrMapping/>
+  </p:clrMapOvr>
+</p:notes>
+</file>
+
+<file path=ppt/notesSlides/notesSlide17.xml><?xml version="1.0" encoding="utf-8"?>
+<p:notes xmlns:a="http://schemas.openxmlformats.org/drawingml/2006/main" xmlns:r="http://schemas.openxmlformats.org/officeDocument/2006/relationships" xmlns:p="http://schemas.openxmlformats.org/presentationml/2006/main">
+  <p:cSld>
+    <p:spTree>
+      <p:nvGrpSpPr>
+        <p:cNvPr id="1" name=""/>
+        <p:cNvGrpSpPr/>
+        <p:nvPr/>
+      </p:nvGrpSpPr>
+      <p:grpSpPr>
+        <a:xfrm>
+          <a:off x="0" y="0"/>
+          <a:ext cx="0" cy="0"/>
+          <a:chOff x="0" y="0"/>
+          <a:chExt cx="0" cy="0"/>
+        </a:xfrm>
+      </p:grpSpPr>
+      <p:sp>
+        <p:nvSpPr>
+          <p:cNvPr id="2" name="Rectangle 2"/>
+          <p:cNvSpPr>
+            <a:spLocks noGrp="1" noRot="1" noChangeAspect="1"/>
+          </p:cNvSpPr>
+          <p:nvPr>
+            <p:ph type="sldImg"/>
+          </p:nvPr>
+        </p:nvSpPr>
+        <p:spPr/>
+      </p:sp>
+      <p:sp>
+        <p:nvSpPr>
+          <p:cNvPr id="3" name="Rectangle 3"/>
+          <p:cNvSpPr>
+            <a:spLocks noGrp="1"/>
+          </p:cNvSpPr>
+          <p:nvPr>
+            <p:ph type="body" idx="1"/>
+          </p:nvPr>
+        </p:nvSpPr>
+        <p:spPr/>
+        <p:txBody>
+          <a:bodyPr/>
+          <a:lstStyle/>
+          <a:p>
+            <a:pPr marL="0" lvl="0" indent="0">
+              <a:spcBef>
+                <a:spcPct val="20000"/>
+              </a:spcBef>
+              <a:buFont typeface="Arial"/>
+              <a:buNone/>
+              <a:defRPr lang="pt-BR"/>
+            </a:pPr>
+            <a:endParaRPr lang="pt-BR" dirty="0"/>
+          </a:p>
+        </p:txBody>
+      </p:sp>
+      <p:sp>
+        <p:nvSpPr>
+          <p:cNvPr id="4" name="Rectangle 4"/>
+          <p:cNvSpPr>
+            <a:spLocks noGrp="1"/>
+          </p:cNvSpPr>
+          <p:nvPr>
+            <p:ph type="sldNum" sz="quarter" idx="10"/>
+          </p:nvPr>
+        </p:nvSpPr>
+        <p:spPr/>
+        <p:txBody>
+          <a:bodyPr/>
+          <a:lstStyle/>
+          <a:p>
+            <a:fld id="{61807874-5299-41B2-A37A-6AA3547857F4}" type="slidenum">
+              <a:rPr lang="pt-BR" smtClean="0"/>
+              <a:pPr/>
+              <a:t>17</a:t>
+            </a:fld>
+            <a:endParaRPr lang="pt-BR"/>
+          </a:p>
+        </p:txBody>
+      </p:sp>
+    </p:spTree>
+    <p:extLst>
+      <p:ext uri="{BB962C8B-B14F-4D97-AF65-F5344CB8AC3E}">
+        <p14:creationId xmlns:p14="http://schemas.microsoft.com/office/powerpoint/2010/main" val="3179966386"/>
+      </p:ext>
+    </p:extLst>
+  </p:cSld>
+  <p:clrMapOvr>
+    <a:masterClrMapping/>
+  </p:clrMapOvr>
+</p:notes>
+</file>
+
+<file path=ppt/notesSlides/notesSlide18.xml><?xml version="1.0" encoding="utf-8"?>
+<p:notes xmlns:a="http://schemas.openxmlformats.org/drawingml/2006/main" xmlns:r="http://schemas.openxmlformats.org/officeDocument/2006/relationships" xmlns:p="http://schemas.openxmlformats.org/presentationml/2006/main">
+  <p:cSld>
+    <p:spTree>
+      <p:nvGrpSpPr>
+        <p:cNvPr id="1" name=""/>
+        <p:cNvGrpSpPr/>
+        <p:nvPr/>
+      </p:nvGrpSpPr>
+      <p:grpSpPr>
+        <a:xfrm>
+          <a:off x="0" y="0"/>
+          <a:ext cx="0" cy="0"/>
+          <a:chOff x="0" y="0"/>
+          <a:chExt cx="0" cy="0"/>
+        </a:xfrm>
+      </p:grpSpPr>
+      <p:sp>
+        <p:nvSpPr>
+          <p:cNvPr id="2" name="Rectangle 2"/>
+          <p:cNvSpPr>
+            <a:spLocks noGrp="1" noRot="1" noChangeAspect="1"/>
+          </p:cNvSpPr>
+          <p:nvPr>
+            <p:ph type="sldImg"/>
+          </p:nvPr>
+        </p:nvSpPr>
+        <p:spPr/>
+      </p:sp>
+      <p:sp>
+        <p:nvSpPr>
+          <p:cNvPr id="3" name="Rectangle 3"/>
+          <p:cNvSpPr>
+            <a:spLocks noGrp="1"/>
+          </p:cNvSpPr>
+          <p:nvPr>
+            <p:ph type="body" idx="1"/>
+          </p:nvPr>
+        </p:nvSpPr>
+        <p:spPr/>
+        <p:txBody>
+          <a:bodyPr/>
+          <a:lstStyle/>
+          <a:p>
+            <a:pPr marL="0" lvl="0" indent="0">
+              <a:spcBef>
+                <a:spcPct val="20000"/>
+              </a:spcBef>
+              <a:buFont typeface="Arial"/>
+              <a:buNone/>
+              <a:defRPr lang="pt-BR"/>
+            </a:pPr>
+            <a:endParaRPr lang="pt-BR" dirty="0"/>
+          </a:p>
+        </p:txBody>
+      </p:sp>
+      <p:sp>
+        <p:nvSpPr>
+          <p:cNvPr id="4" name="Rectangle 4"/>
+          <p:cNvSpPr>
+            <a:spLocks noGrp="1"/>
+          </p:cNvSpPr>
+          <p:nvPr>
+            <p:ph type="sldNum" sz="quarter" idx="10"/>
+          </p:nvPr>
+        </p:nvSpPr>
+        <p:spPr/>
+        <p:txBody>
+          <a:bodyPr/>
+          <a:lstStyle/>
+          <a:p>
+            <a:fld id="{61807874-5299-41B2-A37A-6AA3547857F4}" type="slidenum">
+              <a:rPr lang="pt-BR" smtClean="0"/>
+              <a:pPr/>
+              <a:t>18</a:t>
+            </a:fld>
+            <a:endParaRPr lang="pt-BR"/>
+          </a:p>
+        </p:txBody>
+      </p:sp>
+    </p:spTree>
+    <p:extLst>
+      <p:ext uri="{BB962C8B-B14F-4D97-AF65-F5344CB8AC3E}">
+        <p14:creationId xmlns:p14="http://schemas.microsoft.com/office/powerpoint/2010/main" val="2268625720"/>
+      </p:ext>
+    </p:extLst>
+  </p:cSld>
+  <p:clrMapOvr>
+    <a:masterClrMapping/>
+  </p:clrMapOvr>
+</p:notes>
+</file>
+
+<file path=ppt/notesSlides/notesSlide19.xml><?xml version="1.0" encoding="utf-8"?>
+<p:notes xmlns:a="http://schemas.openxmlformats.org/drawingml/2006/main" xmlns:r="http://schemas.openxmlformats.org/officeDocument/2006/relationships" xmlns:p="http://schemas.openxmlformats.org/presentationml/2006/main">
+  <p:cSld>
+    <p:spTree>
+      <p:nvGrpSpPr>
+        <p:cNvPr id="1" name=""/>
+        <p:cNvGrpSpPr/>
+        <p:nvPr/>
+      </p:nvGrpSpPr>
+      <p:grpSpPr>
+        <a:xfrm>
+          <a:off x="0" y="0"/>
+          <a:ext cx="0" cy="0"/>
+          <a:chOff x="0" y="0"/>
+          <a:chExt cx="0" cy="0"/>
+        </a:xfrm>
+      </p:grpSpPr>
+      <p:sp>
+        <p:nvSpPr>
+          <p:cNvPr id="2" name="Rectangle 2"/>
+          <p:cNvSpPr>
+            <a:spLocks noGrp="1" noRot="1" noChangeAspect="1"/>
+          </p:cNvSpPr>
+          <p:nvPr>
+            <p:ph type="sldImg"/>
+          </p:nvPr>
+        </p:nvSpPr>
+        <p:spPr/>
+      </p:sp>
+      <p:sp>
+        <p:nvSpPr>
+          <p:cNvPr id="3" name="Rectangle 3"/>
+          <p:cNvSpPr>
+            <a:spLocks noGrp="1"/>
+          </p:cNvSpPr>
+          <p:nvPr>
+            <p:ph type="body" idx="1"/>
+          </p:nvPr>
+        </p:nvSpPr>
+        <p:spPr/>
+        <p:txBody>
+          <a:bodyPr/>
+          <a:lstStyle/>
+          <a:p>
             <a:pPr marL="342900" lvl="0" indent="-342900">
               <a:spcBef>
                 <a:spcPct val="20000"/>
@@ -1494,18 +2171,13 @@
             <a:fld id="{61807874-5299-41B2-A37A-6AA3547857F4}" type="slidenum">
               <a:rPr lang="pt-BR" smtClean="0"/>
               <a:pPr/>
-              <a:t>14</a:t>
+              <a:t>19</a:t>
             </a:fld>
             <a:endParaRPr lang="pt-BR"/>
           </a:p>
         </p:txBody>
       </p:sp>
     </p:spTree>
-    <p:extLst>
-      <p:ext uri="{BB962C8B-B14F-4D97-AF65-F5344CB8AC3E}">
-        <p14:creationId xmlns:p14="http://schemas.microsoft.com/office/powerpoint/2010/main" val="2477212209"/>
-      </p:ext>
-    </p:extLst>
   </p:cSld>
   <p:clrMapOvr>
     <a:masterClrMapping/>
@@ -1586,6 +2258,99 @@
         </p:txBody>
       </p:sp>
     </p:spTree>
+  </p:cSld>
+  <p:clrMapOvr>
+    <a:masterClrMapping/>
+  </p:clrMapOvr>
+</p:notes>
+</file>
+
+<file path=ppt/notesSlides/notesSlide20.xml><?xml version="1.0" encoding="utf-8"?>
+<p:notes xmlns:a="http://schemas.openxmlformats.org/drawingml/2006/main" xmlns:r="http://schemas.openxmlformats.org/officeDocument/2006/relationships" xmlns:p="http://schemas.openxmlformats.org/presentationml/2006/main">
+  <p:cSld>
+    <p:spTree>
+      <p:nvGrpSpPr>
+        <p:cNvPr id="1" name=""/>
+        <p:cNvGrpSpPr/>
+        <p:nvPr/>
+      </p:nvGrpSpPr>
+      <p:grpSpPr>
+        <a:xfrm>
+          <a:off x="0" y="0"/>
+          <a:ext cx="0" cy="0"/>
+          <a:chOff x="0" y="0"/>
+          <a:chExt cx="0" cy="0"/>
+        </a:xfrm>
+      </p:grpSpPr>
+      <p:sp>
+        <p:nvSpPr>
+          <p:cNvPr id="2" name="Rectangle 2"/>
+          <p:cNvSpPr>
+            <a:spLocks noGrp="1" noRot="1" noChangeAspect="1"/>
+          </p:cNvSpPr>
+          <p:nvPr>
+            <p:ph type="sldImg"/>
+          </p:nvPr>
+        </p:nvSpPr>
+        <p:spPr/>
+      </p:sp>
+      <p:sp>
+        <p:nvSpPr>
+          <p:cNvPr id="3" name="Rectangle 3"/>
+          <p:cNvSpPr>
+            <a:spLocks noGrp="1"/>
+          </p:cNvSpPr>
+          <p:nvPr>
+            <p:ph type="body" idx="1"/>
+          </p:nvPr>
+        </p:nvSpPr>
+        <p:spPr/>
+        <p:txBody>
+          <a:bodyPr/>
+          <a:lstStyle/>
+          <a:p>
+            <a:pPr marL="342900" lvl="0" indent="-342900">
+              <a:spcBef>
+                <a:spcPct val="20000"/>
+              </a:spcBef>
+              <a:buFont typeface="Arial"/>
+              <a:buChar char="•"/>
+              <a:defRPr lang="pt-BR"/>
+            </a:pPr>
+            <a:endParaRPr lang="pt-BR" dirty="0"/>
+          </a:p>
+        </p:txBody>
+      </p:sp>
+      <p:sp>
+        <p:nvSpPr>
+          <p:cNvPr id="4" name="Rectangle 4"/>
+          <p:cNvSpPr>
+            <a:spLocks noGrp="1"/>
+          </p:cNvSpPr>
+          <p:nvPr>
+            <p:ph type="sldNum" sz="quarter" idx="10"/>
+          </p:nvPr>
+        </p:nvSpPr>
+        <p:spPr/>
+        <p:txBody>
+          <a:bodyPr/>
+          <a:lstStyle/>
+          <a:p>
+            <a:fld id="{61807874-5299-41B2-A37A-6AA3547857F4}" type="slidenum">
+              <a:rPr lang="pt-BR" smtClean="0"/>
+              <a:pPr/>
+              <a:t>20</a:t>
+            </a:fld>
+            <a:endParaRPr lang="pt-BR"/>
+          </a:p>
+        </p:txBody>
+      </p:sp>
+    </p:spTree>
+    <p:extLst>
+      <p:ext uri="{BB962C8B-B14F-4D97-AF65-F5344CB8AC3E}">
+        <p14:creationId xmlns:p14="http://schemas.microsoft.com/office/powerpoint/2010/main" val="2477212209"/>
+      </p:ext>
+    </p:extLst>
   </p:cSld>
   <p:clrMapOvr>
     <a:masterClrMapping/>
@@ -2100,51 +2865,242 @@
           <a:bodyPr/>
           <a:lstStyle/>
           <a:p>
-            <a:pPr marL="342900" lvl="0" indent="-342900">
+            <a:pPr marL="0" lvl="0" indent="0">
               <a:spcBef>
                 <a:spcPct val="20000"/>
               </a:spcBef>
               <a:buFont typeface="Arial"/>
-              <a:buChar char="•"/>
+              <a:buNone/>
               <a:defRPr lang="pt-BR"/>
             </a:pPr>
             <a:r>
-              <a:rPr lang="pt-BR" sz="1200" b="0" i="0" kern="1200" dirty="0">
-                <a:solidFill>
-                  <a:schemeClr val="tx1"/>
-                </a:solidFill>
-                <a:effectLst/>
-                <a:latin typeface="+mn-lt"/>
-                <a:ea typeface="+mn-ea"/>
-                <a:cs typeface="+mn-cs"/>
-              </a:rPr>
-              <a:t>A declaração do construtor é sempre o nome da classe seguido pela lista de parâmetros. A palavra </a:t>
-            </a:r>
-            <a:r>
-              <a:rPr lang="pt-BR" sz="1200" b="0" i="0" kern="1200" dirty="0" err="1">
-                <a:solidFill>
-                  <a:schemeClr val="tx1"/>
-                </a:solidFill>
-                <a:effectLst/>
-                <a:latin typeface="+mn-lt"/>
-                <a:ea typeface="+mn-ea"/>
-                <a:cs typeface="+mn-cs"/>
-              </a:rPr>
-              <a:t>public</a:t>
-            </a:r>
-            <a:r>
-              <a:rPr lang="pt-BR" sz="1200" b="0" i="0" kern="1200" dirty="0">
-                <a:solidFill>
-                  <a:schemeClr val="tx1"/>
-                </a:solidFill>
-                <a:effectLst/>
-                <a:latin typeface="+mn-lt"/>
-                <a:ea typeface="+mn-ea"/>
-                <a:cs typeface="+mn-cs"/>
-              </a:rPr>
-              <a:t> indica que o construtor é público, de modo que pode ser invocado por qualquer classe. Um ponto importante sobre construtores é que eles não criam nem retornam objetos; quem faz isso é a palavra reservada new. O construtor apenas executa algum procedimento sobre o objeto criado pelo comando new. Este construtor, no caso, recebe os nomes como parâmetros e os atribui aos atributos.</a:t>
-            </a:r>
+              <a:rPr lang="pt-BR" dirty="0"/>
+              <a:t>Exemplo: </a:t>
+            </a:r>
+          </a:p>
+          <a:p>
+            <a:pPr marL="0" lvl="0" indent="0">
+              <a:spcBef>
+                <a:spcPct val="20000"/>
+              </a:spcBef>
+              <a:buFont typeface="Arial"/>
+              <a:buNone/>
+              <a:defRPr lang="pt-BR"/>
+            </a:pPr>
+            <a:r>
+              <a:rPr lang="pt-BR" dirty="0" err="1"/>
+              <a:t>Package.teste</a:t>
+            </a:r>
+            <a:r>
+              <a:rPr lang="pt-BR" dirty="0"/>
+              <a:t>;</a:t>
+            </a:r>
+          </a:p>
+          <a:p>
+            <a:pPr marL="0" lvl="0" indent="0">
+              <a:spcBef>
+                <a:spcPct val="20000"/>
+              </a:spcBef>
+              <a:buFont typeface="Arial"/>
+              <a:buNone/>
+              <a:defRPr lang="pt-BR"/>
+            </a:pPr>
             <a:endParaRPr lang="pt-BR" dirty="0"/>
+          </a:p>
+          <a:p>
+            <a:pPr marL="0" lvl="0" indent="0">
+              <a:spcBef>
+                <a:spcPct val="20000"/>
+              </a:spcBef>
+              <a:buFont typeface="Arial"/>
+              <a:buNone/>
+              <a:defRPr lang="pt-BR"/>
+            </a:pPr>
+            <a:r>
+              <a:rPr lang="pt-BR" dirty="0" err="1"/>
+              <a:t>Public</a:t>
+            </a:r>
+            <a:r>
+              <a:rPr lang="pt-BR" dirty="0"/>
+              <a:t> </a:t>
+            </a:r>
+            <a:r>
+              <a:rPr lang="pt-BR" dirty="0" err="1"/>
+              <a:t>class</a:t>
+            </a:r>
+            <a:r>
+              <a:rPr lang="pt-BR" dirty="0"/>
+              <a:t> Teste() {</a:t>
+            </a:r>
+            <a:br>
+              <a:rPr lang="pt-BR" dirty="0"/>
+            </a:br>
+            <a:r>
+              <a:rPr lang="pt-BR" dirty="0"/>
+              <a:t>	</a:t>
+            </a:r>
+            <a:r>
+              <a:rPr lang="pt-BR" dirty="0" err="1"/>
+              <a:t>private</a:t>
+            </a:r>
+            <a:r>
+              <a:rPr lang="pt-BR" dirty="0"/>
+              <a:t> </a:t>
+            </a:r>
+            <a:r>
+              <a:rPr lang="pt-BR" dirty="0" err="1"/>
+              <a:t>int</a:t>
+            </a:r>
+            <a:r>
+              <a:rPr lang="pt-BR" dirty="0"/>
+              <a:t> a;</a:t>
+            </a:r>
+          </a:p>
+          <a:p>
+            <a:pPr marL="0" lvl="0" indent="0">
+              <a:spcBef>
+                <a:spcPct val="20000"/>
+              </a:spcBef>
+              <a:buFont typeface="Arial"/>
+              <a:buNone/>
+              <a:defRPr lang="pt-BR"/>
+            </a:pPr>
+            <a:r>
+              <a:rPr lang="pt-BR" dirty="0"/>
+              <a:t>	</a:t>
+            </a:r>
+            <a:r>
+              <a:rPr lang="pt-BR" dirty="0" err="1"/>
+              <a:t>private</a:t>
+            </a:r>
+            <a:r>
+              <a:rPr lang="pt-BR" dirty="0"/>
+              <a:t> </a:t>
+            </a:r>
+            <a:r>
+              <a:rPr lang="pt-BR" dirty="0" err="1"/>
+              <a:t>int</a:t>
+            </a:r>
+            <a:r>
+              <a:rPr lang="pt-BR" dirty="0"/>
+              <a:t> b;</a:t>
+            </a:r>
+          </a:p>
+          <a:p>
+            <a:pPr marL="0" lvl="0" indent="0">
+              <a:spcBef>
+                <a:spcPct val="20000"/>
+              </a:spcBef>
+              <a:buFont typeface="Arial"/>
+              <a:buNone/>
+              <a:defRPr lang="pt-BR"/>
+            </a:pPr>
+            <a:r>
+              <a:rPr lang="pt-BR" dirty="0"/>
+              <a:t>	</a:t>
+            </a:r>
+            <a:r>
+              <a:rPr lang="pt-BR" dirty="0" err="1"/>
+              <a:t>private</a:t>
+            </a:r>
+            <a:r>
+              <a:rPr lang="pt-BR" dirty="0"/>
+              <a:t> </a:t>
+            </a:r>
+            <a:r>
+              <a:rPr lang="pt-BR" dirty="0" err="1"/>
+              <a:t>int</a:t>
+            </a:r>
+            <a:r>
+              <a:rPr lang="pt-BR" dirty="0"/>
+              <a:t> somar(a, b) {</a:t>
+            </a:r>
+          </a:p>
+          <a:p>
+            <a:pPr marL="0" lvl="0" indent="0">
+              <a:spcBef>
+                <a:spcPct val="20000"/>
+              </a:spcBef>
+              <a:buFont typeface="Arial"/>
+              <a:buNone/>
+              <a:defRPr lang="pt-BR"/>
+            </a:pPr>
+            <a:r>
+              <a:rPr lang="pt-BR" dirty="0"/>
+              <a:t>		</a:t>
+            </a:r>
+            <a:r>
+              <a:rPr lang="pt-BR" dirty="0" err="1"/>
+              <a:t>return</a:t>
+            </a:r>
+            <a:r>
+              <a:rPr lang="pt-BR" dirty="0"/>
+              <a:t> </a:t>
+            </a:r>
+            <a:r>
+              <a:rPr lang="pt-BR" dirty="0" err="1"/>
+              <a:t>a+b</a:t>
+            </a:r>
+            <a:r>
+              <a:rPr lang="pt-BR" dirty="0"/>
+              <a:t>;</a:t>
+            </a:r>
+          </a:p>
+          <a:p>
+            <a:pPr marL="0" lvl="0" indent="0">
+              <a:spcBef>
+                <a:spcPct val="20000"/>
+              </a:spcBef>
+              <a:buFont typeface="Arial"/>
+              <a:buNone/>
+              <a:defRPr lang="pt-BR"/>
+            </a:pPr>
+            <a:r>
+              <a:rPr lang="pt-BR" dirty="0"/>
+              <a:t>	}</a:t>
+            </a:r>
+          </a:p>
+          <a:p>
+            <a:pPr marL="0" lvl="0" indent="0">
+              <a:spcBef>
+                <a:spcPct val="20000"/>
+              </a:spcBef>
+              <a:buFont typeface="Arial"/>
+              <a:buNone/>
+              <a:defRPr lang="pt-BR"/>
+            </a:pPr>
+            <a:r>
+              <a:rPr lang="pt-BR" dirty="0"/>
+              <a:t>}</a:t>
+            </a:r>
+          </a:p>
+          <a:p>
+            <a:pPr marL="0" lvl="0" indent="0">
+              <a:spcBef>
+                <a:spcPct val="20000"/>
+              </a:spcBef>
+              <a:buFont typeface="Arial"/>
+              <a:buNone/>
+              <a:defRPr lang="pt-BR"/>
+            </a:pPr>
+            <a:r>
+              <a:rPr lang="pt-BR" dirty="0"/>
+              <a:t>Teste está visível e poderá ser acessado por qualquer outra classe que importe o pacote ao qual ela pertence.</a:t>
+            </a:r>
+          </a:p>
+          <a:p>
+            <a:pPr marL="0" lvl="0" indent="0">
+              <a:spcBef>
+                <a:spcPct val="20000"/>
+              </a:spcBef>
+              <a:buFont typeface="Arial"/>
+              <a:buNone/>
+              <a:defRPr lang="pt-BR"/>
+            </a:pPr>
+            <a:r>
+              <a:rPr lang="pt-BR" dirty="0"/>
+              <a:t>Os atributos ”a” e “b” e o métodos somar só pode ser acessado dentro da classe Teste.</a:t>
+            </a:r>
           </a:p>
         </p:txBody>
       </p:sp>
@@ -2175,7 +3131,7 @@
     </p:spTree>
     <p:extLst>
       <p:ext uri="{BB962C8B-B14F-4D97-AF65-F5344CB8AC3E}">
-        <p14:creationId xmlns:p14="http://schemas.microsoft.com/office/powerpoint/2010/main" val="1150619858"/>
+        <p14:creationId xmlns:p14="http://schemas.microsoft.com/office/powerpoint/2010/main" val="3170970398"/>
       </p:ext>
     </p:extLst>
   </p:cSld>
@@ -2229,20 +3185,6 @@
           <a:bodyPr/>
           <a:lstStyle/>
           <a:p>
-            <a:pPr marL="342900" lvl="0" indent="-342900">
-              <a:spcBef>
-                <a:spcPct val="20000"/>
-              </a:spcBef>
-              <a:buFont typeface="Arial"/>
-              <a:buChar char="•"/>
-              <a:defRPr lang="pt-BR"/>
-            </a:pPr>
-            <a:r>
-              <a:rPr lang="pt-BR" dirty="0"/>
-              <a:t>O método que será executado vai depender dos parâmetros passados.</a:t>
-            </a:r>
-          </a:p>
-          <a:p>
             <a:pPr marL="0" lvl="0" indent="0">
               <a:spcBef>
                 <a:spcPct val="20000"/>
@@ -2251,20 +3193,17 @@
               <a:buNone/>
               <a:defRPr lang="pt-BR"/>
             </a:pPr>
-            <a:endParaRPr lang="pt-BR" dirty="0"/>
-          </a:p>
-          <a:p>
-            <a:pPr marL="0" lvl="0" indent="0">
-              <a:spcBef>
-                <a:spcPct val="20000"/>
-              </a:spcBef>
-              <a:buFont typeface="Arial"/>
-              <a:buNone/>
-              <a:defRPr lang="pt-BR"/>
-            </a:pPr>
             <a:r>
               <a:rPr lang="pt-BR" dirty="0"/>
-              <a:t>Também existe a sobrecarga de construtores.</a:t>
+              <a:t>Mostrar na prática como funciona método estático, usando </a:t>
+            </a:r>
+            <a:r>
+              <a:rPr lang="pt-BR" dirty="0" err="1"/>
+              <a:t>Utils</a:t>
+            </a:r>
+            <a:r>
+              <a:rPr lang="pt-BR" dirty="0"/>
+              <a:t> como exemplo.</a:t>
             </a:r>
           </a:p>
         </p:txBody>
@@ -2296,7 +3235,7 @@
     </p:spTree>
     <p:extLst>
       <p:ext uri="{BB962C8B-B14F-4D97-AF65-F5344CB8AC3E}">
-        <p14:creationId xmlns:p14="http://schemas.microsoft.com/office/powerpoint/2010/main" val="4168105884"/>
+        <p14:creationId xmlns:p14="http://schemas.microsoft.com/office/powerpoint/2010/main" val="3261249111"/>
       </p:ext>
     </p:extLst>
   </p:cSld>
@@ -2350,248 +3289,50 @@
           <a:bodyPr/>
           <a:lstStyle/>
           <a:p>
-            <a:pPr marL="0" lvl="0" indent="0">
+            <a:pPr marL="342900" lvl="0" indent="-342900">
               <a:spcBef>
                 <a:spcPct val="20000"/>
               </a:spcBef>
               <a:buFont typeface="Arial"/>
-              <a:buNone/>
+              <a:buChar char="•"/>
               <a:defRPr lang="pt-BR"/>
             </a:pPr>
             <a:r>
-              <a:rPr lang="pt-BR" dirty="0"/>
-              <a:t>Mostrar um exemplo ao vivo, para melhor compreensão.</a:t>
-            </a:r>
-          </a:p>
-          <a:p>
-            <a:pPr marL="0" lvl="0" indent="0">
-              <a:spcBef>
-                <a:spcPct val="20000"/>
-              </a:spcBef>
-              <a:buFont typeface="Arial"/>
-              <a:buNone/>
-              <a:defRPr lang="pt-BR"/>
-            </a:pPr>
-            <a:r>
-              <a:rPr lang="pt-BR" dirty="0" err="1"/>
-              <a:t>class</a:t>
-            </a:r>
-            <a:r>
-              <a:rPr lang="pt-BR" dirty="0"/>
-              <a:t> Empregado {</a:t>
-            </a:r>
-          </a:p>
-          <a:p>
-            <a:pPr marL="0" lvl="0" indent="0">
-              <a:spcBef>
-                <a:spcPct val="20000"/>
-              </a:spcBef>
-              <a:buFont typeface="Arial"/>
-              <a:buNone/>
-              <a:defRPr lang="pt-BR"/>
-            </a:pPr>
-            <a:r>
-              <a:rPr lang="pt-BR" dirty="0"/>
-              <a:t>	</a:t>
-            </a:r>
-            <a:r>
-              <a:rPr lang="pt-BR" dirty="0" err="1"/>
-              <a:t>static</a:t>
-            </a:r>
-            <a:r>
-              <a:rPr lang="pt-BR" dirty="0"/>
-              <a:t> </a:t>
-            </a:r>
-            <a:r>
-              <a:rPr lang="pt-BR" dirty="0" err="1"/>
-              <a:t>int</a:t>
-            </a:r>
-            <a:r>
-              <a:rPr lang="pt-BR" dirty="0"/>
-              <a:t> total = 0;</a:t>
-            </a:r>
-          </a:p>
-          <a:p>
-            <a:pPr marL="0" lvl="0" indent="0">
-              <a:spcBef>
-                <a:spcPct val="20000"/>
-              </a:spcBef>
-              <a:buFont typeface="Arial"/>
-              <a:buNone/>
-              <a:defRPr lang="pt-BR"/>
-            </a:pPr>
-            <a:r>
-              <a:rPr lang="pt-BR" dirty="0"/>
-              <a:t>	Empregado () {</a:t>
-            </a:r>
-          </a:p>
-          <a:p>
-            <a:pPr marL="0" lvl="0" indent="0">
-              <a:spcBef>
-                <a:spcPct val="20000"/>
-              </a:spcBef>
-              <a:buFont typeface="Arial"/>
-              <a:buNone/>
-              <a:defRPr lang="pt-BR"/>
-            </a:pPr>
-            <a:r>
-              <a:rPr lang="pt-BR" dirty="0"/>
-              <a:t>		total ++;</a:t>
-            </a:r>
-          </a:p>
-          <a:p>
-            <a:pPr marL="0" lvl="0" indent="0">
-              <a:spcBef>
-                <a:spcPct val="20000"/>
-              </a:spcBef>
-              <a:buFont typeface="Arial"/>
-              <a:buNone/>
-              <a:defRPr lang="pt-BR"/>
-            </a:pPr>
-            <a:r>
-              <a:rPr lang="pt-BR" dirty="0"/>
-              <a:t>		</a:t>
-            </a:r>
-            <a:r>
-              <a:rPr lang="pt-BR" dirty="0" err="1"/>
-              <a:t>System.out.println</a:t>
-            </a:r>
-            <a:r>
-              <a:rPr lang="pt-BR" dirty="0"/>
-              <a:t>(total);</a:t>
-            </a:r>
-          </a:p>
-          <a:p>
-            <a:pPr marL="0" lvl="0" indent="0">
-              <a:spcBef>
-                <a:spcPct val="20000"/>
-              </a:spcBef>
-              <a:buFont typeface="Arial"/>
-              <a:buNone/>
-              <a:defRPr lang="pt-BR"/>
-            </a:pPr>
-            <a:r>
-              <a:rPr lang="pt-BR" dirty="0"/>
-              <a:t>	}</a:t>
-            </a:r>
-          </a:p>
-          <a:p>
-            <a:pPr marL="0" lvl="0" indent="0">
-              <a:spcBef>
-                <a:spcPct val="20000"/>
-              </a:spcBef>
-              <a:buFont typeface="Arial"/>
-              <a:buNone/>
-              <a:defRPr lang="pt-BR"/>
-            </a:pPr>
-            <a:r>
-              <a:rPr lang="pt-BR" dirty="0"/>
-              <a:t>}</a:t>
-            </a:r>
-          </a:p>
-          <a:p>
-            <a:pPr marL="0" lvl="0" indent="0">
-              <a:spcBef>
-                <a:spcPct val="20000"/>
-              </a:spcBef>
-              <a:buFont typeface="Arial"/>
-              <a:buNone/>
-              <a:defRPr lang="pt-BR"/>
-            </a:pPr>
-            <a:r>
-              <a:rPr lang="pt-BR" dirty="0"/>
-              <a:t>Teste: </a:t>
-            </a:r>
-          </a:p>
-          <a:p>
-            <a:pPr marL="0" lvl="0" indent="0">
-              <a:spcBef>
-                <a:spcPct val="20000"/>
-              </a:spcBef>
-              <a:buFont typeface="Arial"/>
-              <a:buNone/>
-              <a:defRPr lang="pt-BR"/>
-            </a:pPr>
-            <a:r>
-              <a:rPr lang="pt-BR" dirty="0"/>
-              <a:t>Empregado empregado1 = new Empregado(); // irá imprimir 1</a:t>
-            </a:r>
-          </a:p>
-          <a:p>
-            <a:pPr marL="0" marR="0" lvl="0" indent="0" algn="l" defTabSz="914400" rtl="0" eaLnBrk="1" fontAlgn="auto" latinLnBrk="0" hangingPunct="1">
-              <a:lnSpc>
-                <a:spcPct val="100000"/>
-              </a:lnSpc>
-              <a:spcBef>
-                <a:spcPct val="20000"/>
-              </a:spcBef>
-              <a:spcAft>
-                <a:spcPts val="0"/>
-              </a:spcAft>
-              <a:buClrTx/>
-              <a:buSzTx/>
-              <a:buFont typeface="Arial"/>
-              <a:buNone/>
-              <a:tabLst/>
-              <a:defRPr lang="pt-BR"/>
-            </a:pPr>
-            <a:r>
-              <a:rPr lang="pt-BR" dirty="0"/>
-              <a:t>Empregado empregado2 = new Empregado(); // irá imprimir 2</a:t>
-            </a:r>
-          </a:p>
-          <a:p>
-            <a:pPr marL="0" marR="0" lvl="0" indent="0" algn="l" defTabSz="914400" rtl="0" eaLnBrk="1" fontAlgn="auto" latinLnBrk="0" hangingPunct="1">
-              <a:lnSpc>
-                <a:spcPct val="100000"/>
-              </a:lnSpc>
-              <a:spcBef>
-                <a:spcPct val="20000"/>
-              </a:spcBef>
-              <a:spcAft>
-                <a:spcPts val="0"/>
-              </a:spcAft>
-              <a:buClrTx/>
-              <a:buSzTx/>
-              <a:buFont typeface="Arial"/>
-              <a:buNone/>
-              <a:tabLst/>
-              <a:defRPr lang="pt-BR"/>
-            </a:pPr>
-            <a:endParaRPr lang="pt-BR" dirty="0"/>
-          </a:p>
-          <a:p>
-            <a:pPr marL="0" marR="0" lvl="0" indent="0" algn="l" defTabSz="914400" rtl="0" eaLnBrk="1" fontAlgn="auto" latinLnBrk="0" hangingPunct="1">
-              <a:lnSpc>
-                <a:spcPct val="100000"/>
-              </a:lnSpc>
-              <a:spcBef>
-                <a:spcPct val="20000"/>
-              </a:spcBef>
-              <a:spcAft>
-                <a:spcPts val="0"/>
-              </a:spcAft>
-              <a:buClrTx/>
-              <a:buSzTx/>
-              <a:buFont typeface="Arial"/>
-              <a:buNone/>
-              <a:tabLst/>
-              <a:defRPr lang="pt-BR"/>
-            </a:pPr>
-            <a:r>
-              <a:rPr lang="pt-BR" dirty="0"/>
-              <a:t>Obs. Ao criar empregado, é utilizado a mesma instância da variável que foi alterado pelo objeto anterior.</a:t>
-            </a:r>
-          </a:p>
-          <a:p>
-            <a:pPr marL="0" lvl="0" indent="0">
-              <a:spcBef>
-                <a:spcPct val="20000"/>
-              </a:spcBef>
-              <a:buFont typeface="Arial"/>
-              <a:buNone/>
-              <a:defRPr lang="pt-BR"/>
-            </a:pPr>
+              <a:rPr lang="pt-BR" sz="1200" b="0" i="0" kern="1200" dirty="0">
+                <a:solidFill>
+                  <a:schemeClr val="tx1"/>
+                </a:solidFill>
+                <a:effectLst/>
+                <a:latin typeface="+mn-lt"/>
+                <a:ea typeface="+mn-ea"/>
+                <a:cs typeface="+mn-cs"/>
+              </a:rPr>
+              <a:t>A declaração do construtor é sempre o nome da classe seguido pela lista de parâmetros. A palavra </a:t>
+            </a:r>
+            <a:r>
+              <a:rPr lang="pt-BR" sz="1200" b="0" i="0" kern="1200" dirty="0" err="1">
+                <a:solidFill>
+                  <a:schemeClr val="tx1"/>
+                </a:solidFill>
+                <a:effectLst/>
+                <a:latin typeface="+mn-lt"/>
+                <a:ea typeface="+mn-ea"/>
+                <a:cs typeface="+mn-cs"/>
+              </a:rPr>
+              <a:t>public</a:t>
+            </a:r>
+            <a:r>
+              <a:rPr lang="pt-BR" sz="1200" b="0" i="0" kern="1200" dirty="0">
+                <a:solidFill>
+                  <a:schemeClr val="tx1"/>
+                </a:solidFill>
+                <a:effectLst/>
+                <a:latin typeface="+mn-lt"/>
+                <a:ea typeface="+mn-ea"/>
+                <a:cs typeface="+mn-cs"/>
+              </a:rPr>
+              <a:t> indica que o construtor é público, de modo que pode ser invocado por qualquer classe. Um ponto importante sobre construtores é que eles não criam nem retornam objetos; quem faz isso é a palavra reservada new. O construtor apenas executa algum procedimento sobre o objeto criado pelo comando new. Este construtor, no caso, recebe os nomes como parâmetros e os atribui aos atributos.</a:t>
+            </a:r>
             <a:endParaRPr lang="pt-BR" dirty="0"/>
           </a:p>
         </p:txBody>
@@ -2623,7 +3364,7 @@
     </p:spTree>
     <p:extLst>
       <p:ext uri="{BB962C8B-B14F-4D97-AF65-F5344CB8AC3E}">
-        <p14:creationId xmlns:p14="http://schemas.microsoft.com/office/powerpoint/2010/main" val="398612483"/>
+        <p14:creationId xmlns:p14="http://schemas.microsoft.com/office/powerpoint/2010/main" val="1150619858"/>
       </p:ext>
     </p:extLst>
   </p:cSld>
@@ -8755,7 +9496,19 @@
               <a:rPr lang="pt-BR" dirty="0">
                 <a:effectLst/>
               </a:rPr>
-              <a:t>Variáveis Estáticas</a:t>
+              <a:t>Sobrecarga (</a:t>
+            </a:r>
+            <a:r>
+              <a:rPr lang="pt-BR" dirty="0" err="1">
+                <a:effectLst/>
+              </a:rPr>
+              <a:t>Overload</a:t>
+            </a:r>
+            <a:r>
+              <a:rPr lang="pt-BR" dirty="0">
+                <a:effectLst/>
+              </a:rPr>
+              <a:t>)</a:t>
             </a:r>
           </a:p>
         </p:txBody>
@@ -8804,7 +9557,7 @@
         <p:spPr>
           <a:xfrm>
             <a:off x="762000" y="2967335"/>
-            <a:ext cx="7086600" cy="3416320"/>
+            <a:ext cx="7086600" cy="3785652"/>
           </a:xfrm>
           <a:prstGeom prst="rect">
             <a:avLst/>
@@ -8818,30 +9571,139 @@
           <a:p>
             <a:r>
               <a:rPr lang="pt-BR" sz="2400" dirty="0"/>
-              <a:t>	Ao definirmos uma variável como estática em uma classe, ela será a mesma para todas as instâncias de um objeto.</a:t>
+              <a:t>Definir o mesmo nome de um método já existente apenas com quantidade e tipo de argumentos diferentes caracteriza-se a sobrecarga de métodos.</a:t>
             </a:r>
           </a:p>
           <a:p>
             <a:r>
               <a:rPr lang="pt-BR" sz="2400" dirty="0"/>
-              <a:t>	Ela será compartilhada e todos os objetos que acessarem essa variável estática, acessarão a mesma variável ao alterarmos o valor, ele será alterado para todas as instâncias(objetos). </a:t>
-            </a:r>
-          </a:p>
-          <a:p>
-            <a:endParaRPr lang="pt-BR" sz="2400" dirty="0"/>
-          </a:p>
-          <a:p>
+              <a:t>Ex.: </a:t>
+            </a:r>
+            <a:r>
+              <a:rPr lang="pt-BR" sz="2400" dirty="0" err="1"/>
+              <a:t>public</a:t>
+            </a:r>
             <a:r>
               <a:rPr lang="pt-BR" sz="2400" dirty="0"/>
-              <a:t>Utilizamos a palavra reservada </a:t>
+              <a:t> </a:t>
             </a:r>
             <a:r>
               <a:rPr lang="pt-BR" sz="2400" dirty="0" err="1"/>
-              <a:t>static</a:t>
+              <a:t>int</a:t>
             </a:r>
             <a:r>
               <a:rPr lang="pt-BR" sz="2400" dirty="0"/>
-              <a:t>.</a:t>
+              <a:t> somar(</a:t>
+            </a:r>
+            <a:r>
+              <a:rPr lang="pt-BR" sz="2400" dirty="0" err="1"/>
+              <a:t>int</a:t>
+            </a:r>
+            <a:r>
+              <a:rPr lang="pt-BR" sz="2400" dirty="0"/>
+              <a:t> a, </a:t>
+            </a:r>
+            <a:r>
+              <a:rPr lang="pt-BR" sz="2400" dirty="0" err="1"/>
+              <a:t>int</a:t>
+            </a:r>
+            <a:r>
+              <a:rPr lang="pt-BR" sz="2400" dirty="0"/>
+              <a:t> b) {</a:t>
+            </a:r>
+          </a:p>
+          <a:p>
+            <a:r>
+              <a:rPr lang="pt-BR" sz="2400" dirty="0"/>
+              <a:t>	</a:t>
+            </a:r>
+            <a:r>
+              <a:rPr lang="pt-BR" sz="2400" dirty="0" err="1"/>
+              <a:t>return</a:t>
+            </a:r>
+            <a:r>
+              <a:rPr lang="pt-BR" sz="2400" dirty="0"/>
+              <a:t> a + b;</a:t>
+            </a:r>
+          </a:p>
+          <a:p>
+            <a:r>
+              <a:rPr lang="pt-BR" sz="2400" dirty="0"/>
+              <a:t>}</a:t>
+            </a:r>
+          </a:p>
+          <a:p>
+            <a:r>
+              <a:rPr lang="pt-BR" sz="2400" dirty="0"/>
+              <a:t> </a:t>
+            </a:r>
+            <a:r>
+              <a:rPr lang="pt-BR" sz="2400" dirty="0" err="1"/>
+              <a:t>public</a:t>
+            </a:r>
+            <a:r>
+              <a:rPr lang="pt-BR" sz="2400" dirty="0"/>
+              <a:t> </a:t>
+            </a:r>
+            <a:r>
+              <a:rPr lang="pt-BR" sz="2400" dirty="0" err="1"/>
+              <a:t>int</a:t>
+            </a:r>
+            <a:r>
+              <a:rPr lang="pt-BR" sz="2400" dirty="0"/>
+              <a:t> somar(</a:t>
+            </a:r>
+            <a:r>
+              <a:rPr lang="pt-BR" sz="2400" dirty="0" err="1"/>
+              <a:t>int</a:t>
+            </a:r>
+            <a:r>
+              <a:rPr lang="pt-BR" sz="2400" dirty="0"/>
+              <a:t> a, </a:t>
+            </a:r>
+            <a:r>
+              <a:rPr lang="pt-BR" sz="2400" dirty="0" err="1"/>
+              <a:t>int</a:t>
+            </a:r>
+            <a:r>
+              <a:rPr lang="pt-BR" sz="2400" dirty="0"/>
+              <a:t> b, </a:t>
+            </a:r>
+            <a:r>
+              <a:rPr lang="pt-BR" sz="2400" dirty="0" err="1"/>
+              <a:t>int</a:t>
+            </a:r>
+            <a:r>
+              <a:rPr lang="pt-BR" sz="2400" dirty="0"/>
+              <a:t> c) {</a:t>
+            </a:r>
+          </a:p>
+          <a:p>
+            <a:r>
+              <a:rPr lang="pt-BR" sz="2400" dirty="0"/>
+              <a:t>	</a:t>
+            </a:r>
+            <a:r>
+              <a:rPr lang="pt-BR" sz="2400" dirty="0" err="1"/>
+              <a:t>return</a:t>
+            </a:r>
+            <a:r>
+              <a:rPr lang="pt-BR" sz="2400" dirty="0"/>
+              <a:t> </a:t>
+            </a:r>
+            <a:r>
+              <a:rPr lang="pt-BR" sz="2400" dirty="0" err="1"/>
+              <a:t>a+b+c</a:t>
+            </a:r>
+            <a:r>
+              <a:rPr lang="pt-BR" sz="2400" dirty="0"/>
+              <a:t>;</a:t>
+            </a:r>
+          </a:p>
+          <a:p>
+            <a:r>
+              <a:rPr lang="pt-BR" sz="2400" dirty="0"/>
+              <a:t>}</a:t>
             </a:r>
           </a:p>
         </p:txBody>
@@ -8849,7 +9711,7 @@
     </p:spTree>
     <p:extLst>
       <p:ext uri="{BB962C8B-B14F-4D97-AF65-F5344CB8AC3E}">
-        <p14:creationId xmlns:p14="http://schemas.microsoft.com/office/powerpoint/2010/main" val="79725208"/>
+        <p14:creationId xmlns:p14="http://schemas.microsoft.com/office/powerpoint/2010/main" val="3306914633"/>
       </p:ext>
     </p:extLst>
   </p:cSld>
@@ -8900,7 +9762,7 @@
               <a:rPr lang="pt-BR" dirty="0">
                 <a:effectLst/>
               </a:rPr>
-              <a:t>Métodos Estáticos</a:t>
+              <a:t>Variáveis Estáticas</a:t>
             </a:r>
           </a:p>
         </p:txBody>
@@ -8949,7 +9811,7 @@
         <p:spPr>
           <a:xfrm>
             <a:off x="762000" y="2967335"/>
-            <a:ext cx="7086600" cy="1938992"/>
+            <a:ext cx="7086600" cy="3416320"/>
           </a:xfrm>
           <a:prstGeom prst="rect">
             <a:avLst/>
@@ -8963,7 +9825,30 @@
           <a:p>
             <a:r>
               <a:rPr lang="pt-BR" sz="2400" dirty="0"/>
-              <a:t>Métodos estáticos geralmente são utilizados por classes utilitárias, assim podemos chamar o método a qualquer momento, sem precisar instanciar a classe antes. Exemplo de um método para validar CPF.</a:t>
+              <a:t>	Ao definirmos uma variável como estática em uma classe, ela será a mesma para todas as instâncias de um objeto.</a:t>
+            </a:r>
+          </a:p>
+          <a:p>
+            <a:r>
+              <a:rPr lang="pt-BR" sz="2400" dirty="0"/>
+              <a:t>	Ela será compartilhada e todos os objetos que acessarem essa variável estática, acessarão a mesma variável ao alterarmos o valor, ele será alterado para todas as instâncias(objetos). </a:t>
+            </a:r>
+          </a:p>
+          <a:p>
+            <a:endParaRPr lang="pt-BR" sz="2400" dirty="0"/>
+          </a:p>
+          <a:p>
+            <a:r>
+              <a:rPr lang="pt-BR" sz="2400" dirty="0"/>
+              <a:t>Utilizamos a palavra reservada </a:t>
+            </a:r>
+            <a:r>
+              <a:rPr lang="pt-BR" sz="2400" dirty="0" err="1"/>
+              <a:t>static</a:t>
+            </a:r>
+            <a:r>
+              <a:rPr lang="pt-BR" sz="2400" dirty="0"/>
+              <a:t>.</a:t>
             </a:r>
           </a:p>
         </p:txBody>
@@ -8971,7 +9856,7 @@
     </p:spTree>
     <p:extLst>
       <p:ext uri="{BB962C8B-B14F-4D97-AF65-F5344CB8AC3E}">
-        <p14:creationId xmlns:p14="http://schemas.microsoft.com/office/powerpoint/2010/main" val="1591327545"/>
+        <p14:creationId xmlns:p14="http://schemas.microsoft.com/office/powerpoint/2010/main" val="1472064202"/>
       </p:ext>
     </p:extLst>
   </p:cSld>
@@ -9022,7 +9907,7 @@
               <a:rPr lang="pt-BR" dirty="0">
                 <a:effectLst/>
               </a:rPr>
-              <a:t>Métodos Estáticos</a:t>
+              <a:t>Variáveis Estáticas</a:t>
             </a:r>
           </a:p>
         </p:txBody>
@@ -9071,7 +9956,7 @@
         <p:spPr>
           <a:xfrm>
             <a:off x="762000" y="2967335"/>
-            <a:ext cx="7086600" cy="1938992"/>
+            <a:ext cx="7086600" cy="3416320"/>
           </a:xfrm>
           <a:prstGeom prst="rect">
             <a:avLst/>
@@ -9085,7 +9970,30 @@
           <a:p>
             <a:r>
               <a:rPr lang="pt-BR" sz="2400" dirty="0"/>
-              <a:t>Métodos estáticos geralmente são utilizados por classes utilitárias, assim podemos chamar o método a qualquer momento, sem precisar instanciar a classe antes. Exemplo de um método para validar CPF.</a:t>
+              <a:t>	Ao definirmos uma variável como estática em uma classe, ela será a mesma para todas as instâncias de um objeto.</a:t>
+            </a:r>
+          </a:p>
+          <a:p>
+            <a:r>
+              <a:rPr lang="pt-BR" sz="2400" dirty="0"/>
+              <a:t>	Ela será compartilhada e todos os objetos que acessarem essa variável estática, acessarão a mesma variável ao alterarmos o valor, ele será alterado para todas as instâncias(objetos). </a:t>
+            </a:r>
+          </a:p>
+          <a:p>
+            <a:endParaRPr lang="pt-BR" sz="2400" dirty="0"/>
+          </a:p>
+          <a:p>
+            <a:r>
+              <a:rPr lang="pt-BR" sz="2400" dirty="0"/>
+              <a:t>Utilizamos a palavra reservada </a:t>
+            </a:r>
+            <a:r>
+              <a:rPr lang="pt-BR" sz="2400" dirty="0" err="1"/>
+              <a:t>static</a:t>
+            </a:r>
+            <a:r>
+              <a:rPr lang="pt-BR" sz="2400" dirty="0"/>
+              <a:t>.</a:t>
             </a:r>
           </a:p>
         </p:txBody>
@@ -9093,7 +10001,7 @@
     </p:spTree>
     <p:extLst>
       <p:ext uri="{BB962C8B-B14F-4D97-AF65-F5344CB8AC3E}">
-        <p14:creationId xmlns:p14="http://schemas.microsoft.com/office/powerpoint/2010/main" val="652346509"/>
+        <p14:creationId xmlns:p14="http://schemas.microsoft.com/office/powerpoint/2010/main" val="79725208"/>
       </p:ext>
     </p:extLst>
   </p:cSld>
@@ -9141,8 +10049,10 @@
           <a:lstStyle/>
           <a:p>
             <a:r>
-              <a:rPr lang="pt-BR" sz="4000" dirty="0"/>
-              <a:t>EXTRAS:</a:t>
+              <a:rPr lang="pt-BR" dirty="0">
+                <a:effectLst/>
+              </a:rPr>
+              <a:t>Métodos Estáticos</a:t>
             </a:r>
           </a:p>
         </p:txBody>
@@ -9190,8 +10100,8 @@
         </p:nvSpPr>
         <p:spPr>
           <a:xfrm>
-            <a:off x="762000" y="2703016"/>
-            <a:ext cx="7086600" cy="3785652"/>
+            <a:off x="762000" y="2967335"/>
+            <a:ext cx="7086600" cy="1938992"/>
           </a:xfrm>
           <a:prstGeom prst="rect">
             <a:avLst/>
@@ -9204,66 +10114,8 @@
           <a:lstStyle/>
           <a:p>
             <a:r>
-              <a:rPr lang="pt-BR" sz="2400" b="1" dirty="0"/>
-              <a:t>- Estrutura de controle de decisão.</a:t>
-            </a:r>
-          </a:p>
-          <a:p>
-            <a:r>
               <a:rPr lang="pt-BR" sz="2400" dirty="0"/>
-              <a:t>	</a:t>
-            </a:r>
-            <a:r>
-              <a:rPr lang="pt-BR" sz="2400" dirty="0">
-                <a:solidFill>
-                  <a:srgbClr val="00B0F0"/>
-                </a:solidFill>
-              </a:rPr>
-              <a:t>https://docs.oracle.com/javase/tutorial/java/nutsandbolts/examples/IfElseDemo.java</a:t>
-            </a:r>
-          </a:p>
-          <a:p>
-            <a:r>
-              <a:rPr lang="pt-BR" sz="2400" dirty="0"/>
-              <a:t>- Estrutura de controle de Fluxo. 	</a:t>
-            </a:r>
-            <a:r>
-              <a:rPr lang="pt-BR" sz="2400" dirty="0">
-                <a:solidFill>
-                  <a:srgbClr val="00B0F0"/>
-                </a:solidFill>
-              </a:rPr>
-              <a:t>https://docs.oracle.com/javase/tutorial/java/nutsandbolts/switch.html</a:t>
-            </a:r>
-          </a:p>
-          <a:p>
-            <a:pPr marL="342900" indent="-342900">
-              <a:buFontTx/>
-              <a:buChar char="-"/>
-            </a:pPr>
-            <a:r>
-              <a:rPr lang="pt-BR" sz="2400" dirty="0"/>
-              <a:t>Controle de interrupção.</a:t>
-            </a:r>
-          </a:p>
-          <a:p>
-            <a:r>
-              <a:rPr lang="pt-BR" sz="2400" dirty="0"/>
-              <a:t>	Interrupção permitem que redirecionemos o fluxo de controle do programa.</a:t>
-            </a:r>
-          </a:p>
-          <a:p>
-            <a:r>
-              <a:rPr lang="pt-BR" sz="2400" dirty="0"/>
-              <a:t>	03 Tipos: break, continue, </a:t>
-            </a:r>
-            <a:r>
-              <a:rPr lang="pt-BR" sz="2400" dirty="0" err="1"/>
-              <a:t>return</a:t>
-            </a:r>
-            <a:r>
-              <a:rPr lang="pt-BR" sz="2400" dirty="0"/>
-              <a:t>.</a:t>
+              <a:t>Métodos estáticos geralmente são utilizados por classes utilitárias, assim podemos chamar o método a qualquer momento, sem precisar instanciar a classe antes. Exemplo de um método para validar CPF.</a:t>
             </a:r>
           </a:p>
         </p:txBody>
@@ -9271,7 +10123,7 @@
     </p:spTree>
     <p:extLst>
       <p:ext uri="{BB962C8B-B14F-4D97-AF65-F5344CB8AC3E}">
-        <p14:creationId xmlns:p14="http://schemas.microsoft.com/office/powerpoint/2010/main" val="1677101322"/>
+        <p14:creationId xmlns:p14="http://schemas.microsoft.com/office/powerpoint/2010/main" val="1591327545"/>
       </p:ext>
     </p:extLst>
   </p:cSld>
@@ -9311,12 +10163,7 @@
             <p:ph type="title"/>
           </p:nvPr>
         </p:nvSpPr>
-        <p:spPr>
-          <a:xfrm>
-            <a:off x="228600" y="1676400"/>
-            <a:ext cx="8229600" cy="1143000"/>
-          </a:xfrm>
-        </p:spPr>
+        <p:spPr/>
         <p:txBody>
           <a:bodyPr>
             <a:noAutofit/>
@@ -9324,108 +10171,521 @@
           <a:lstStyle/>
           <a:p>
             <a:r>
-              <a:rPr lang="pt-BR" sz="4000" dirty="0"/>
-              <a:t>EXERCÍCIOS:</a:t>
-            </a:r>
-          </a:p>
-        </p:txBody>
-      </p:sp>
-      <p:sp>
-        <p:nvSpPr>
-          <p:cNvPr id="7" name="Retângulo 6">
-            <a:extLst>
-              <a:ext uri="{FF2B5EF4-FFF2-40B4-BE49-F238E27FC236}">
-                <a16:creationId xmlns:a16="http://schemas.microsoft.com/office/drawing/2014/main" id="{DE871D51-6822-455D-8B97-7F37D0BA5BB9}"/>
-              </a:ext>
-            </a:extLst>
-          </p:cNvPr>
-          <p:cNvSpPr/>
+              <a:rPr lang="pt-BR" dirty="0">
+                <a:effectLst/>
+              </a:rPr>
+              <a:t>Herança</a:t>
+            </a:r>
+          </a:p>
+        </p:txBody>
+      </p:sp>
+      <p:sp>
+        <p:nvSpPr>
+          <p:cNvPr id="4" name="Rectangle 25"/>
+          <p:cNvSpPr txBox="1">
+            <a:spLocks/>
+          </p:cNvSpPr>
           <p:nvPr/>
         </p:nvSpPr>
         <p:spPr>
           <a:xfrm>
-            <a:off x="685800" y="2703016"/>
-            <a:ext cx="7772400" cy="3785652"/>
+            <a:off x="762000" y="2924944"/>
+            <a:ext cx="7086600" cy="3456384"/>
           </a:xfrm>
           <a:prstGeom prst="rect">
             <a:avLst/>
           </a:prstGeom>
         </p:spPr>
         <p:txBody>
-          <a:bodyPr wrap="square">
-            <a:spAutoFit/>
+          <a:bodyPr vert="horz">
+            <a:noAutofit/>
           </a:bodyPr>
           <a:lstStyle/>
           <a:p>
-            <a:pPr marL="457200" indent="-457200">
-              <a:buAutoNum type="arabicParenR"/>
+            <a:pPr marL="342900" lvl="0" indent="-342900">
+              <a:spcBef>
+                <a:spcPct val="20000"/>
+              </a:spcBef>
+              <a:buFont typeface="Arial"/>
+              <a:buChar char="•"/>
+              <a:defRPr lang="pt-BR"/>
             </a:pPr>
-            <a:r>
-              <a:rPr lang="pt-BR" sz="2400" b="1" dirty="0"/>
-              <a:t>Crie 3 loops que informe números sequencias de 0 até 100.</a:t>
-            </a:r>
-          </a:p>
-          <a:p>
-            <a:pPr marL="914400" lvl="1" indent="-457200">
-              <a:buAutoNum type="alphaLcParenR"/>
-            </a:pPr>
-            <a:r>
-              <a:rPr lang="pt-BR" sz="2400" b="1" dirty="0" err="1"/>
-              <a:t>While</a:t>
-            </a:r>
-            <a:endParaRPr lang="pt-BR" sz="2400" b="1" dirty="0"/>
-          </a:p>
-          <a:p>
-            <a:pPr marL="914400" lvl="1" indent="-457200">
-              <a:buAutoNum type="alphaLcParenR"/>
-            </a:pPr>
-            <a:r>
-              <a:rPr lang="pt-BR" sz="2400" b="1" dirty="0"/>
-              <a:t>Do-</a:t>
-            </a:r>
-            <a:r>
-              <a:rPr lang="pt-BR" sz="2400" b="1" dirty="0" err="1"/>
-              <a:t>while</a:t>
-            </a:r>
-            <a:endParaRPr lang="pt-BR" sz="2400" b="1" dirty="0"/>
-          </a:p>
-          <a:p>
-            <a:pPr marL="914400" lvl="1" indent="-457200">
-              <a:buAutoNum type="alphaLcParenR"/>
-            </a:pPr>
-            <a:r>
-              <a:rPr lang="pt-BR" sz="2400" b="1" dirty="0"/>
-              <a:t>For </a:t>
-            </a:r>
-          </a:p>
-          <a:p>
-            <a:pPr marL="457200" indent="-457200">
-              <a:buAutoNum type="arabicParenR"/>
-            </a:pPr>
-            <a:endParaRPr lang="pt-BR" sz="2400" b="1" dirty="0"/>
-          </a:p>
-          <a:p>
-            <a:pPr marL="457200" indent="-457200">
-              <a:buFontTx/>
-              <a:buAutoNum type="arabicParenR"/>
-            </a:pPr>
-            <a:r>
-              <a:rPr lang="pt-BR" sz="2400" b="1" dirty="0"/>
-              <a:t>Crie um gerador de número aleatório de 0 a 10, após isso faça um loop e peça para usuário tentar acertar o número gerado em 5 tentativas. </a:t>
-            </a:r>
-          </a:p>
-          <a:p>
-            <a:pPr marL="457200" indent="-457200">
-              <a:buAutoNum type="arabicParenR"/>
-            </a:pPr>
-            <a:endParaRPr lang="pt-BR" sz="2400" b="1" dirty="0"/>
+            <a:endParaRPr lang="pt-BR" sz="2400" kern="0" dirty="0"/>
           </a:p>
         </p:txBody>
       </p:sp>
     </p:spTree>
     <p:extLst>
       <p:ext uri="{BB962C8B-B14F-4D97-AF65-F5344CB8AC3E}">
-        <p14:creationId xmlns:p14="http://schemas.microsoft.com/office/powerpoint/2010/main" val="1832021912"/>
+        <p14:creationId xmlns:p14="http://schemas.microsoft.com/office/powerpoint/2010/main" val="1161665761"/>
+      </p:ext>
+    </p:extLst>
+  </p:cSld>
+  <p:clrMapOvr>
+    <a:masterClrMapping/>
+  </p:clrMapOvr>
+  <p:transition>
+    <p:fade/>
+  </p:transition>
+</p:sld>
+</file>
+
+<file path=ppt/slides/slide15.xml><?xml version="1.0" encoding="utf-8"?>
+<p:sld xmlns:a="http://schemas.openxmlformats.org/drawingml/2006/main" xmlns:r="http://schemas.openxmlformats.org/officeDocument/2006/relationships" xmlns:p="http://schemas.openxmlformats.org/presentationml/2006/main">
+  <p:cSld>
+    <p:spTree>
+      <p:nvGrpSpPr>
+        <p:cNvPr id="1" name=""/>
+        <p:cNvGrpSpPr/>
+        <p:nvPr/>
+      </p:nvGrpSpPr>
+      <p:grpSpPr>
+        <a:xfrm>
+          <a:off x="0" y="0"/>
+          <a:ext cx="0" cy="0"/>
+          <a:chOff x="0" y="0"/>
+          <a:chExt cx="0" cy="0"/>
+        </a:xfrm>
+      </p:grpSpPr>
+      <p:sp>
+        <p:nvSpPr>
+          <p:cNvPr id="3" name="Rectangle 8"/>
+          <p:cNvSpPr>
+            <a:spLocks noGrp="1"/>
+          </p:cNvSpPr>
+          <p:nvPr>
+            <p:ph type="title"/>
+          </p:nvPr>
+        </p:nvSpPr>
+        <p:spPr/>
+        <p:txBody>
+          <a:bodyPr>
+            <a:noAutofit/>
+          </a:bodyPr>
+          <a:lstStyle/>
+          <a:p>
+            <a:r>
+              <a:rPr lang="pt-BR" dirty="0">
+                <a:effectLst/>
+              </a:rPr>
+              <a:t>Polimorfismo</a:t>
+            </a:r>
+          </a:p>
+        </p:txBody>
+      </p:sp>
+      <p:sp>
+        <p:nvSpPr>
+          <p:cNvPr id="4" name="Rectangle 25"/>
+          <p:cNvSpPr txBox="1">
+            <a:spLocks/>
+          </p:cNvSpPr>
+          <p:nvPr/>
+        </p:nvSpPr>
+        <p:spPr>
+          <a:xfrm>
+            <a:off x="762000" y="2924944"/>
+            <a:ext cx="7086600" cy="3456384"/>
+          </a:xfrm>
+          <a:prstGeom prst="rect">
+            <a:avLst/>
+          </a:prstGeom>
+        </p:spPr>
+        <p:txBody>
+          <a:bodyPr vert="horz">
+            <a:noAutofit/>
+          </a:bodyPr>
+          <a:lstStyle/>
+          <a:p>
+            <a:pPr marL="342900" lvl="0" indent="-342900">
+              <a:spcBef>
+                <a:spcPct val="20000"/>
+              </a:spcBef>
+              <a:buFont typeface="Arial"/>
+              <a:buChar char="•"/>
+              <a:defRPr lang="pt-BR"/>
+            </a:pPr>
+            <a:endParaRPr lang="pt-BR" sz="2400" kern="0" dirty="0"/>
+          </a:p>
+        </p:txBody>
+      </p:sp>
+    </p:spTree>
+    <p:extLst>
+      <p:ext uri="{BB962C8B-B14F-4D97-AF65-F5344CB8AC3E}">
+        <p14:creationId xmlns:p14="http://schemas.microsoft.com/office/powerpoint/2010/main" val="905425937"/>
+      </p:ext>
+    </p:extLst>
+  </p:cSld>
+  <p:clrMapOvr>
+    <a:masterClrMapping/>
+  </p:clrMapOvr>
+  <p:transition>
+    <p:fade/>
+  </p:transition>
+</p:sld>
+</file>
+
+<file path=ppt/slides/slide16.xml><?xml version="1.0" encoding="utf-8"?>
+<p:sld xmlns:a="http://schemas.openxmlformats.org/drawingml/2006/main" xmlns:r="http://schemas.openxmlformats.org/officeDocument/2006/relationships" xmlns:p="http://schemas.openxmlformats.org/presentationml/2006/main">
+  <p:cSld>
+    <p:spTree>
+      <p:nvGrpSpPr>
+        <p:cNvPr id="1" name=""/>
+        <p:cNvGrpSpPr/>
+        <p:nvPr/>
+      </p:nvGrpSpPr>
+      <p:grpSpPr>
+        <a:xfrm>
+          <a:off x="0" y="0"/>
+          <a:ext cx="0" cy="0"/>
+          <a:chOff x="0" y="0"/>
+          <a:chExt cx="0" cy="0"/>
+        </a:xfrm>
+      </p:grpSpPr>
+      <p:sp>
+        <p:nvSpPr>
+          <p:cNvPr id="3" name="Rectangle 8"/>
+          <p:cNvSpPr>
+            <a:spLocks noGrp="1"/>
+          </p:cNvSpPr>
+          <p:nvPr>
+            <p:ph type="title"/>
+          </p:nvPr>
+        </p:nvSpPr>
+        <p:spPr/>
+        <p:txBody>
+          <a:bodyPr>
+            <a:noAutofit/>
+          </a:bodyPr>
+          <a:lstStyle/>
+          <a:p>
+            <a:r>
+              <a:rPr lang="pt-BR" dirty="0">
+                <a:effectLst/>
+              </a:rPr>
+              <a:t>Classes abstratas</a:t>
+            </a:r>
+          </a:p>
+        </p:txBody>
+      </p:sp>
+      <p:sp>
+        <p:nvSpPr>
+          <p:cNvPr id="4" name="Rectangle 25"/>
+          <p:cNvSpPr txBox="1">
+            <a:spLocks/>
+          </p:cNvSpPr>
+          <p:nvPr/>
+        </p:nvSpPr>
+        <p:spPr>
+          <a:xfrm>
+            <a:off x="762000" y="2924944"/>
+            <a:ext cx="7086600" cy="3456384"/>
+          </a:xfrm>
+          <a:prstGeom prst="rect">
+            <a:avLst/>
+          </a:prstGeom>
+        </p:spPr>
+        <p:txBody>
+          <a:bodyPr vert="horz">
+            <a:noAutofit/>
+          </a:bodyPr>
+          <a:lstStyle/>
+          <a:p>
+            <a:pPr marL="342900" lvl="0" indent="-342900">
+              <a:spcBef>
+                <a:spcPct val="20000"/>
+              </a:spcBef>
+              <a:buFont typeface="Arial"/>
+              <a:buChar char="•"/>
+              <a:defRPr lang="pt-BR"/>
+            </a:pPr>
+            <a:endParaRPr lang="pt-BR" sz="2400" kern="0" dirty="0"/>
+          </a:p>
+        </p:txBody>
+      </p:sp>
+    </p:spTree>
+    <p:extLst>
+      <p:ext uri="{BB962C8B-B14F-4D97-AF65-F5344CB8AC3E}">
+        <p14:creationId xmlns:p14="http://schemas.microsoft.com/office/powerpoint/2010/main" val="2728065919"/>
+      </p:ext>
+    </p:extLst>
+  </p:cSld>
+  <p:clrMapOvr>
+    <a:masterClrMapping/>
+  </p:clrMapOvr>
+  <p:transition>
+    <p:fade/>
+  </p:transition>
+</p:sld>
+</file>
+
+<file path=ppt/slides/slide17.xml><?xml version="1.0" encoding="utf-8"?>
+<p:sld xmlns:a="http://schemas.openxmlformats.org/drawingml/2006/main" xmlns:r="http://schemas.openxmlformats.org/officeDocument/2006/relationships" xmlns:p="http://schemas.openxmlformats.org/presentationml/2006/main">
+  <p:cSld>
+    <p:spTree>
+      <p:nvGrpSpPr>
+        <p:cNvPr id="1" name=""/>
+        <p:cNvGrpSpPr/>
+        <p:nvPr/>
+      </p:nvGrpSpPr>
+      <p:grpSpPr>
+        <a:xfrm>
+          <a:off x="0" y="0"/>
+          <a:ext cx="0" cy="0"/>
+          <a:chOff x="0" y="0"/>
+          <a:chExt cx="0" cy="0"/>
+        </a:xfrm>
+      </p:grpSpPr>
+      <p:sp>
+        <p:nvSpPr>
+          <p:cNvPr id="3" name="Rectangle 8"/>
+          <p:cNvSpPr>
+            <a:spLocks noGrp="1"/>
+          </p:cNvSpPr>
+          <p:nvPr>
+            <p:ph type="title"/>
+          </p:nvPr>
+        </p:nvSpPr>
+        <p:spPr/>
+        <p:txBody>
+          <a:bodyPr>
+            <a:noAutofit/>
+          </a:bodyPr>
+          <a:lstStyle/>
+          <a:p>
+            <a:r>
+              <a:rPr lang="pt-BR" dirty="0">
+                <a:effectLst/>
+              </a:rPr>
+              <a:t>Métodos abstratos</a:t>
+            </a:r>
+          </a:p>
+        </p:txBody>
+      </p:sp>
+      <p:sp>
+        <p:nvSpPr>
+          <p:cNvPr id="4" name="Rectangle 25"/>
+          <p:cNvSpPr txBox="1">
+            <a:spLocks/>
+          </p:cNvSpPr>
+          <p:nvPr/>
+        </p:nvSpPr>
+        <p:spPr>
+          <a:xfrm>
+            <a:off x="762000" y="2924944"/>
+            <a:ext cx="7086600" cy="3456384"/>
+          </a:xfrm>
+          <a:prstGeom prst="rect">
+            <a:avLst/>
+          </a:prstGeom>
+        </p:spPr>
+        <p:txBody>
+          <a:bodyPr vert="horz">
+            <a:noAutofit/>
+          </a:bodyPr>
+          <a:lstStyle/>
+          <a:p>
+            <a:pPr marL="342900" lvl="0" indent="-342900">
+              <a:spcBef>
+                <a:spcPct val="20000"/>
+              </a:spcBef>
+              <a:buFont typeface="Arial"/>
+              <a:buChar char="•"/>
+              <a:defRPr lang="pt-BR"/>
+            </a:pPr>
+            <a:endParaRPr lang="pt-BR" sz="2400" kern="0" dirty="0"/>
+          </a:p>
+        </p:txBody>
+      </p:sp>
+    </p:spTree>
+    <p:extLst>
+      <p:ext uri="{BB962C8B-B14F-4D97-AF65-F5344CB8AC3E}">
+        <p14:creationId xmlns:p14="http://schemas.microsoft.com/office/powerpoint/2010/main" val="1505444992"/>
+      </p:ext>
+    </p:extLst>
+  </p:cSld>
+  <p:clrMapOvr>
+    <a:masterClrMapping/>
+  </p:clrMapOvr>
+  <p:transition>
+    <p:fade/>
+  </p:transition>
+</p:sld>
+</file>
+
+<file path=ppt/slides/slide18.xml><?xml version="1.0" encoding="utf-8"?>
+<p:sld xmlns:a="http://schemas.openxmlformats.org/drawingml/2006/main" xmlns:r="http://schemas.openxmlformats.org/officeDocument/2006/relationships" xmlns:p="http://schemas.openxmlformats.org/presentationml/2006/main">
+  <p:cSld>
+    <p:spTree>
+      <p:nvGrpSpPr>
+        <p:cNvPr id="1" name=""/>
+        <p:cNvGrpSpPr/>
+        <p:nvPr/>
+      </p:nvGrpSpPr>
+      <p:grpSpPr>
+        <a:xfrm>
+          <a:off x="0" y="0"/>
+          <a:ext cx="0" cy="0"/>
+          <a:chOff x="0" y="0"/>
+          <a:chExt cx="0" cy="0"/>
+        </a:xfrm>
+      </p:grpSpPr>
+      <p:sp>
+        <p:nvSpPr>
+          <p:cNvPr id="3" name="Rectangle 8"/>
+          <p:cNvSpPr>
+            <a:spLocks noGrp="1"/>
+          </p:cNvSpPr>
+          <p:nvPr>
+            <p:ph type="title"/>
+          </p:nvPr>
+        </p:nvSpPr>
+        <p:spPr/>
+        <p:txBody>
+          <a:bodyPr>
+            <a:noAutofit/>
+          </a:bodyPr>
+          <a:lstStyle/>
+          <a:p>
+            <a:r>
+              <a:rPr lang="pt-BR" dirty="0">
+                <a:effectLst/>
+              </a:rPr>
+              <a:t>Interfaces</a:t>
+            </a:r>
+          </a:p>
+        </p:txBody>
+      </p:sp>
+      <p:sp>
+        <p:nvSpPr>
+          <p:cNvPr id="4" name="Rectangle 25"/>
+          <p:cNvSpPr txBox="1">
+            <a:spLocks/>
+          </p:cNvSpPr>
+          <p:nvPr/>
+        </p:nvSpPr>
+        <p:spPr>
+          <a:xfrm>
+            <a:off x="762000" y="2924944"/>
+            <a:ext cx="7086600" cy="3456384"/>
+          </a:xfrm>
+          <a:prstGeom prst="rect">
+            <a:avLst/>
+          </a:prstGeom>
+        </p:spPr>
+        <p:txBody>
+          <a:bodyPr vert="horz">
+            <a:noAutofit/>
+          </a:bodyPr>
+          <a:lstStyle/>
+          <a:p>
+            <a:pPr marL="342900" lvl="0" indent="-342900">
+              <a:spcBef>
+                <a:spcPct val="20000"/>
+              </a:spcBef>
+              <a:buFont typeface="Arial"/>
+              <a:buChar char="•"/>
+              <a:defRPr lang="pt-BR"/>
+            </a:pPr>
+            <a:endParaRPr lang="pt-BR" sz="2400" kern="0" dirty="0"/>
+          </a:p>
+        </p:txBody>
+      </p:sp>
+    </p:spTree>
+    <p:extLst>
+      <p:ext uri="{BB962C8B-B14F-4D97-AF65-F5344CB8AC3E}">
+        <p14:creationId xmlns:p14="http://schemas.microsoft.com/office/powerpoint/2010/main" val="66932961"/>
+      </p:ext>
+    </p:extLst>
+  </p:cSld>
+  <p:clrMapOvr>
+    <a:masterClrMapping/>
+  </p:clrMapOvr>
+  <p:transition>
+    <p:fade/>
+  </p:transition>
+</p:sld>
+</file>
+
+<file path=ppt/slides/slide19.xml><?xml version="1.0" encoding="utf-8"?>
+<p:sld xmlns:a="http://schemas.openxmlformats.org/drawingml/2006/main" xmlns:r="http://schemas.openxmlformats.org/officeDocument/2006/relationships" xmlns:p="http://schemas.openxmlformats.org/presentationml/2006/main">
+  <p:cSld>
+    <p:spTree>
+      <p:nvGrpSpPr>
+        <p:cNvPr id="1" name=""/>
+        <p:cNvGrpSpPr/>
+        <p:nvPr/>
+      </p:nvGrpSpPr>
+      <p:grpSpPr>
+        <a:xfrm>
+          <a:off x="0" y="0"/>
+          <a:ext cx="0" cy="0"/>
+          <a:chOff x="0" y="0"/>
+          <a:chExt cx="0" cy="0"/>
+        </a:xfrm>
+      </p:grpSpPr>
+      <p:sp>
+        <p:nvSpPr>
+          <p:cNvPr id="3" name="Rectangle 8"/>
+          <p:cNvSpPr>
+            <a:spLocks noGrp="1"/>
+          </p:cNvSpPr>
+          <p:nvPr>
+            <p:ph type="title"/>
+          </p:nvPr>
+        </p:nvSpPr>
+        <p:spPr/>
+        <p:txBody>
+          <a:bodyPr>
+            <a:noAutofit/>
+          </a:bodyPr>
+          <a:lstStyle/>
+          <a:p>
+            <a:r>
+              <a:rPr lang="pt-BR" sz="4000" dirty="0"/>
+              <a:t>EXTRAS:</a:t>
+            </a:r>
+          </a:p>
+        </p:txBody>
+      </p:sp>
+      <p:sp>
+        <p:nvSpPr>
+          <p:cNvPr id="4" name="Rectangle 25"/>
+          <p:cNvSpPr txBox="1">
+            <a:spLocks/>
+          </p:cNvSpPr>
+          <p:nvPr/>
+        </p:nvSpPr>
+        <p:spPr>
+          <a:xfrm>
+            <a:off x="762000" y="2924944"/>
+            <a:ext cx="7086600" cy="3456384"/>
+          </a:xfrm>
+          <a:prstGeom prst="rect">
+            <a:avLst/>
+          </a:prstGeom>
+        </p:spPr>
+        <p:txBody>
+          <a:bodyPr vert="horz">
+            <a:noAutofit/>
+          </a:bodyPr>
+          <a:lstStyle/>
+          <a:p>
+            <a:pPr marL="342900" lvl="0" indent="-342900">
+              <a:spcBef>
+                <a:spcPct val="20000"/>
+              </a:spcBef>
+              <a:buFont typeface="Arial"/>
+              <a:buChar char="•"/>
+              <a:defRPr lang="pt-BR"/>
+            </a:pPr>
+            <a:endParaRPr lang="pt-BR" sz="2400" kern="0" dirty="0"/>
+          </a:p>
+        </p:txBody>
+      </p:sp>
+    </p:spTree>
+    <p:extLst>
+      <p:ext uri="{BB962C8B-B14F-4D97-AF65-F5344CB8AC3E}">
+        <p14:creationId xmlns:p14="http://schemas.microsoft.com/office/powerpoint/2010/main" val="1677101322"/>
       </p:ext>
     </p:extLst>
   </p:cSld>
@@ -9562,6 +10822,160 @@
   <p:clrMapOvr>
     <a:masterClrMapping/>
   </p:clrMapOvr>
+</p:sld>
+</file>
+
+<file path=ppt/slides/slide20.xml><?xml version="1.0" encoding="utf-8"?>
+<p:sld xmlns:a="http://schemas.openxmlformats.org/drawingml/2006/main" xmlns:r="http://schemas.openxmlformats.org/officeDocument/2006/relationships" xmlns:p="http://schemas.openxmlformats.org/presentationml/2006/main">
+  <p:cSld>
+    <p:spTree>
+      <p:nvGrpSpPr>
+        <p:cNvPr id="1" name=""/>
+        <p:cNvGrpSpPr/>
+        <p:nvPr/>
+      </p:nvGrpSpPr>
+      <p:grpSpPr>
+        <a:xfrm>
+          <a:off x="0" y="0"/>
+          <a:ext cx="0" cy="0"/>
+          <a:chOff x="0" y="0"/>
+          <a:chExt cx="0" cy="0"/>
+        </a:xfrm>
+      </p:grpSpPr>
+      <p:sp>
+        <p:nvSpPr>
+          <p:cNvPr id="3" name="Rectangle 8"/>
+          <p:cNvSpPr>
+            <a:spLocks noGrp="1"/>
+          </p:cNvSpPr>
+          <p:nvPr>
+            <p:ph type="title"/>
+          </p:nvPr>
+        </p:nvSpPr>
+        <p:spPr>
+          <a:xfrm>
+            <a:off x="228600" y="1676400"/>
+            <a:ext cx="8229600" cy="1143000"/>
+          </a:xfrm>
+        </p:spPr>
+        <p:txBody>
+          <a:bodyPr>
+            <a:noAutofit/>
+          </a:bodyPr>
+          <a:lstStyle/>
+          <a:p>
+            <a:r>
+              <a:rPr lang="pt-BR" sz="4000" dirty="0"/>
+              <a:t>EXERCÍCIOS:</a:t>
+            </a:r>
+          </a:p>
+        </p:txBody>
+      </p:sp>
+      <p:sp>
+        <p:nvSpPr>
+          <p:cNvPr id="7" name="Retângulo 6">
+            <a:extLst>
+              <a:ext uri="{FF2B5EF4-FFF2-40B4-BE49-F238E27FC236}">
+                <a16:creationId xmlns:a16="http://schemas.microsoft.com/office/drawing/2014/main" id="{DE871D51-6822-455D-8B97-7F37D0BA5BB9}"/>
+              </a:ext>
+            </a:extLst>
+          </p:cNvPr>
+          <p:cNvSpPr/>
+          <p:nvPr/>
+        </p:nvSpPr>
+        <p:spPr>
+          <a:xfrm>
+            <a:off x="685800" y="2703016"/>
+            <a:ext cx="7772400" cy="3785652"/>
+          </a:xfrm>
+          <a:prstGeom prst="rect">
+            <a:avLst/>
+          </a:prstGeom>
+        </p:spPr>
+        <p:txBody>
+          <a:bodyPr wrap="square">
+            <a:spAutoFit/>
+          </a:bodyPr>
+          <a:lstStyle/>
+          <a:p>
+            <a:pPr marL="457200" indent="-457200">
+              <a:buAutoNum type="arabicParenR"/>
+            </a:pPr>
+            <a:r>
+              <a:rPr lang="pt-BR" sz="2400" b="1" dirty="0"/>
+              <a:t>Crie 3 loops que informe números sequencias de 0 até 100.</a:t>
+            </a:r>
+          </a:p>
+          <a:p>
+            <a:pPr marL="914400" lvl="1" indent="-457200">
+              <a:buAutoNum type="alphaLcParenR"/>
+            </a:pPr>
+            <a:r>
+              <a:rPr lang="pt-BR" sz="2400" b="1" dirty="0" err="1"/>
+              <a:t>While</a:t>
+            </a:r>
+            <a:endParaRPr lang="pt-BR" sz="2400" b="1" dirty="0"/>
+          </a:p>
+          <a:p>
+            <a:pPr marL="914400" lvl="1" indent="-457200">
+              <a:buAutoNum type="alphaLcParenR"/>
+            </a:pPr>
+            <a:r>
+              <a:rPr lang="pt-BR" sz="2400" b="1" dirty="0"/>
+              <a:t>Do-</a:t>
+            </a:r>
+            <a:r>
+              <a:rPr lang="pt-BR" sz="2400" b="1" dirty="0" err="1"/>
+              <a:t>while</a:t>
+            </a:r>
+            <a:endParaRPr lang="pt-BR" sz="2400" b="1" dirty="0"/>
+          </a:p>
+          <a:p>
+            <a:pPr marL="914400" lvl="1" indent="-457200">
+              <a:buAutoNum type="alphaLcParenR"/>
+            </a:pPr>
+            <a:r>
+              <a:rPr lang="pt-BR" sz="2400" b="1" dirty="0"/>
+              <a:t>For </a:t>
+            </a:r>
+          </a:p>
+          <a:p>
+            <a:pPr marL="457200" indent="-457200">
+              <a:buAutoNum type="arabicParenR"/>
+            </a:pPr>
+            <a:endParaRPr lang="pt-BR" sz="2400" b="1" dirty="0"/>
+          </a:p>
+          <a:p>
+            <a:pPr marL="457200" indent="-457200">
+              <a:buFontTx/>
+              <a:buAutoNum type="arabicParenR"/>
+            </a:pPr>
+            <a:r>
+              <a:rPr lang="pt-BR" sz="2400" b="1" dirty="0"/>
+              <a:t>Crie um gerador de número aleatório de 0 a 10, após isso faça um loop e peça para usuário tentar acertar o número gerado em 5 tentativas. </a:t>
+            </a:r>
+          </a:p>
+          <a:p>
+            <a:pPr marL="457200" indent="-457200">
+              <a:buAutoNum type="arabicParenR"/>
+            </a:pPr>
+            <a:endParaRPr lang="pt-BR" sz="2400" b="1" dirty="0"/>
+          </a:p>
+        </p:txBody>
+      </p:sp>
+    </p:spTree>
+    <p:extLst>
+      <p:ext uri="{BB962C8B-B14F-4D97-AF65-F5344CB8AC3E}">
+        <p14:creationId xmlns:p14="http://schemas.microsoft.com/office/powerpoint/2010/main" val="1832021912"/>
+      </p:ext>
+    </p:extLst>
+  </p:cSld>
+  <p:clrMapOvr>
+    <a:masterClrMapping/>
+  </p:clrMapOvr>
+  <p:transition>
+    <p:fade/>
+  </p:transition>
 </p:sld>
 </file>
 
@@ -10222,7 +11636,7 @@
               <a:rPr lang="pt-BR" dirty="0">
                 <a:effectLst/>
               </a:rPr>
-              <a:t>Construtores</a:t>
+              <a:t>Modificadores de acesso</a:t>
             </a:r>
           </a:p>
         </p:txBody>
@@ -10271,7 +11685,7 @@
         <p:spPr>
           <a:xfrm>
             <a:off x="762000" y="2967335"/>
-            <a:ext cx="7086600" cy="3785652"/>
+            <a:ext cx="7086600" cy="3416320"/>
           </a:xfrm>
           <a:prstGeom prst="rect">
             <a:avLst/>
@@ -10284,97 +11698,59 @@
           <a:lstStyle/>
           <a:p>
             <a:r>
-              <a:rPr lang="pt-BR" sz="2400" dirty="0"/>
-              <a:t>Construtores são usados para garantir que ao instanciar um objeto, os valores dos atributos sejam preenchidos.</a:t>
-            </a:r>
-          </a:p>
-          <a:p>
-            <a:endParaRPr lang="pt-BR" sz="2400" dirty="0"/>
-          </a:p>
-          <a:p>
-            <a:r>
-              <a:rPr lang="pt-BR" sz="2400" dirty="0"/>
-              <a:t>Ex. </a:t>
-            </a:r>
-            <a:r>
-              <a:rPr lang="pt-BR" sz="2400" dirty="0" err="1"/>
-              <a:t>public</a:t>
-            </a:r>
-            <a:r>
-              <a:rPr lang="pt-BR" sz="2400" dirty="0"/>
-              <a:t> Carro(</a:t>
-            </a:r>
-            <a:r>
-              <a:rPr lang="pt-BR" sz="2400" dirty="0" err="1"/>
-              <a:t>String</a:t>
-            </a:r>
-            <a:r>
-              <a:rPr lang="pt-BR" sz="2400" dirty="0"/>
-              <a:t> cor, </a:t>
-            </a:r>
-            <a:r>
-              <a:rPr lang="pt-BR" sz="2400" dirty="0" err="1"/>
-              <a:t>String</a:t>
-            </a:r>
-            <a:r>
-              <a:rPr lang="pt-BR" sz="2400" dirty="0"/>
-              <a:t> modelo, </a:t>
-            </a:r>
-            <a:r>
-              <a:rPr lang="pt-BR" sz="2400" dirty="0" err="1"/>
-              <a:t>String</a:t>
-            </a:r>
-            <a:r>
-              <a:rPr lang="pt-BR" sz="2400" dirty="0"/>
-              <a:t> segmento) {</a:t>
-            </a:r>
-          </a:p>
-          <a:p>
-            <a:r>
-              <a:rPr lang="pt-BR" sz="2400" dirty="0"/>
-              <a:t>		</a:t>
-            </a:r>
-            <a:r>
-              <a:rPr lang="pt-BR" sz="2400" dirty="0" err="1"/>
-              <a:t>this.cor</a:t>
-            </a:r>
-            <a:r>
-              <a:rPr lang="pt-BR" sz="2400" dirty="0"/>
-              <a:t> = cor;</a:t>
-            </a:r>
-          </a:p>
-          <a:p>
-            <a:r>
-              <a:rPr lang="pt-BR" sz="2400" dirty="0"/>
-              <a:t>		</a:t>
-            </a:r>
-            <a:r>
-              <a:rPr lang="pt-BR" sz="2400" dirty="0" err="1"/>
-              <a:t>this.modelo</a:t>
-            </a:r>
-            <a:r>
-              <a:rPr lang="pt-BR" sz="2400" dirty="0"/>
-              <a:t> = modelo;</a:t>
-            </a:r>
-          </a:p>
-          <a:p>
-            <a:r>
-              <a:rPr lang="pt-BR" sz="2400" dirty="0"/>
-              <a:t>		</a:t>
-            </a:r>
-            <a:r>
-              <a:rPr lang="pt-BR" sz="2400" dirty="0" err="1"/>
-              <a:t>this.segmento</a:t>
-            </a:r>
-            <a:r>
-              <a:rPr lang="pt-BR" sz="2400" dirty="0"/>
-              <a:t> = segmento;</a:t>
-            </a:r>
-          </a:p>
-          <a:p>
-            <a:r>
-              <a:rPr lang="pt-BR" sz="2400" dirty="0"/>
-              <a:t>	}</a:t>
+              <a:rPr lang="pt-BR" dirty="0"/>
+              <a:t>Modificadores de acesso são utilizados para classes, atributos e método. </a:t>
+            </a:r>
+          </a:p>
+          <a:p>
+            <a:r>
+              <a:rPr lang="pt-BR" dirty="0"/>
+              <a:t>Modificadores:</a:t>
+            </a:r>
+          </a:p>
+          <a:p>
+            <a:r>
+              <a:rPr lang="pt-BR" b="1" dirty="0" err="1"/>
+              <a:t>Public</a:t>
+            </a:r>
+            <a:r>
+              <a:rPr lang="pt-BR" b="1" dirty="0"/>
+              <a:t>:</a:t>
+            </a:r>
+            <a:r>
+              <a:rPr lang="pt-BR" dirty="0"/>
+              <a:t> Classe e os seus membros podem ser acessados de qualquer lugar que importe o pacote.</a:t>
+            </a:r>
+            <a:endParaRPr lang="pt-BR" b="1" dirty="0"/>
+          </a:p>
+          <a:p>
+            <a:r>
+              <a:rPr lang="pt-BR" b="1" dirty="0"/>
+              <a:t>Private: M</a:t>
+            </a:r>
+            <a:r>
+              <a:rPr lang="pt-BR" dirty="0"/>
+              <a:t>étodo/atributo não pode ser acessado por qualquer outra classe. Esse modificador não se aplica as classes.</a:t>
+            </a:r>
+          </a:p>
+          <a:p>
+            <a:r>
+              <a:rPr lang="pt-BR" dirty="0" err="1"/>
+              <a:t>Protected</a:t>
+            </a:r>
+            <a:r>
+              <a:rPr lang="pt-BR" dirty="0"/>
+              <a:t>: Membros da classe podem ser acessados por classes do mesmo pacote ou através de herança</a:t>
+            </a:r>
+          </a:p>
+          <a:p>
+            <a:r>
+              <a:rPr lang="pt-BR" dirty="0" err="1"/>
+              <a:t>Defalt</a:t>
+            </a:r>
+            <a:r>
+              <a:rPr lang="pt-BR" dirty="0"/>
+              <a:t> (padrão): Classes e/ou membros podem ser acessados somente por classes do mesmo pacote. Na declaração não é necessário especificar nada.</a:t>
             </a:r>
           </a:p>
         </p:txBody>
@@ -10382,7 +11758,7 @@
     </p:spTree>
     <p:extLst>
       <p:ext uri="{BB962C8B-B14F-4D97-AF65-F5344CB8AC3E}">
-        <p14:creationId xmlns:p14="http://schemas.microsoft.com/office/powerpoint/2010/main" val="3795687807"/>
+        <p14:creationId xmlns:p14="http://schemas.microsoft.com/office/powerpoint/2010/main" val="652346509"/>
       </p:ext>
     </p:extLst>
   </p:cSld>
@@ -10433,19 +11809,19 @@
               <a:rPr lang="pt-BR" dirty="0">
                 <a:effectLst/>
               </a:rPr>
-              <a:t>Sobrecarga (</a:t>
+              <a:t>Métodos </a:t>
             </a:r>
             <a:r>
               <a:rPr lang="pt-BR" dirty="0" err="1">
                 <a:effectLst/>
               </a:rPr>
-              <a:t>Overload</a:t>
+              <a:t>get</a:t>
             </a:r>
             <a:r>
               <a:rPr lang="pt-BR" dirty="0">
                 <a:effectLst/>
               </a:rPr>
-              <a:t>)</a:t>
+              <a:t> e set</a:t>
             </a:r>
           </a:p>
         </p:txBody>
@@ -10485,170 +11861,10 @@
           </a:p>
         </p:txBody>
       </p:sp>
-      <p:sp>
-        <p:nvSpPr>
-          <p:cNvPr id="2" name="Retângulo 1"/>
-          <p:cNvSpPr/>
-          <p:nvPr/>
-        </p:nvSpPr>
-        <p:spPr>
-          <a:xfrm>
-            <a:off x="762000" y="2967335"/>
-            <a:ext cx="7086600" cy="3785652"/>
-          </a:xfrm>
-          <a:prstGeom prst="rect">
-            <a:avLst/>
-          </a:prstGeom>
-        </p:spPr>
-        <p:txBody>
-          <a:bodyPr wrap="square">
-            <a:spAutoFit/>
-          </a:bodyPr>
-          <a:lstStyle/>
-          <a:p>
-            <a:r>
-              <a:rPr lang="pt-BR" sz="2400" dirty="0"/>
-              <a:t>Definir o mesmo nome de um método já existente apenas com quantidade e tipo de argumentos diferentes caracteriza-se a sobrecarga de métodos.</a:t>
-            </a:r>
-          </a:p>
-          <a:p>
-            <a:r>
-              <a:rPr lang="pt-BR" sz="2400" dirty="0"/>
-              <a:t>Ex.: </a:t>
-            </a:r>
-            <a:r>
-              <a:rPr lang="pt-BR" sz="2400" dirty="0" err="1"/>
-              <a:t>public</a:t>
-            </a:r>
-            <a:r>
-              <a:rPr lang="pt-BR" sz="2400" dirty="0"/>
-              <a:t> </a:t>
-            </a:r>
-            <a:r>
-              <a:rPr lang="pt-BR" sz="2400" dirty="0" err="1"/>
-              <a:t>int</a:t>
-            </a:r>
-            <a:r>
-              <a:rPr lang="pt-BR" sz="2400" dirty="0"/>
-              <a:t> somar(</a:t>
-            </a:r>
-            <a:r>
-              <a:rPr lang="pt-BR" sz="2400" dirty="0" err="1"/>
-              <a:t>int</a:t>
-            </a:r>
-            <a:r>
-              <a:rPr lang="pt-BR" sz="2400" dirty="0"/>
-              <a:t> a, </a:t>
-            </a:r>
-            <a:r>
-              <a:rPr lang="pt-BR" sz="2400" dirty="0" err="1"/>
-              <a:t>int</a:t>
-            </a:r>
-            <a:r>
-              <a:rPr lang="pt-BR" sz="2400" dirty="0"/>
-              <a:t> b) {</a:t>
-            </a:r>
-          </a:p>
-          <a:p>
-            <a:r>
-              <a:rPr lang="pt-BR" sz="2400" dirty="0"/>
-              <a:t>	</a:t>
-            </a:r>
-            <a:r>
-              <a:rPr lang="pt-BR" sz="2400" dirty="0" err="1"/>
-              <a:t>return</a:t>
-            </a:r>
-            <a:r>
-              <a:rPr lang="pt-BR" sz="2400" dirty="0"/>
-              <a:t> a + b;</a:t>
-            </a:r>
-          </a:p>
-          <a:p>
-            <a:r>
-              <a:rPr lang="pt-BR" sz="2400" dirty="0"/>
-              <a:t>}</a:t>
-            </a:r>
-          </a:p>
-          <a:p>
-            <a:r>
-              <a:rPr lang="pt-BR" sz="2400" dirty="0"/>
-              <a:t> </a:t>
-            </a:r>
-            <a:r>
-              <a:rPr lang="pt-BR" sz="2400" dirty="0" err="1"/>
-              <a:t>public</a:t>
-            </a:r>
-            <a:r>
-              <a:rPr lang="pt-BR" sz="2400" dirty="0"/>
-              <a:t> </a:t>
-            </a:r>
-            <a:r>
-              <a:rPr lang="pt-BR" sz="2400" dirty="0" err="1"/>
-              <a:t>int</a:t>
-            </a:r>
-            <a:r>
-              <a:rPr lang="pt-BR" sz="2400" dirty="0"/>
-              <a:t> somar(</a:t>
-            </a:r>
-            <a:r>
-              <a:rPr lang="pt-BR" sz="2400" dirty="0" err="1"/>
-              <a:t>int</a:t>
-            </a:r>
-            <a:r>
-              <a:rPr lang="pt-BR" sz="2400" dirty="0"/>
-              <a:t> a, </a:t>
-            </a:r>
-            <a:r>
-              <a:rPr lang="pt-BR" sz="2400" dirty="0" err="1"/>
-              <a:t>int</a:t>
-            </a:r>
-            <a:r>
-              <a:rPr lang="pt-BR" sz="2400" dirty="0"/>
-              <a:t> b, </a:t>
-            </a:r>
-            <a:r>
-              <a:rPr lang="pt-BR" sz="2400" dirty="0" err="1"/>
-              <a:t>int</a:t>
-            </a:r>
-            <a:r>
-              <a:rPr lang="pt-BR" sz="2400" dirty="0"/>
-              <a:t> c) {</a:t>
-            </a:r>
-          </a:p>
-          <a:p>
-            <a:r>
-              <a:rPr lang="pt-BR" sz="2400" dirty="0"/>
-              <a:t>	</a:t>
-            </a:r>
-            <a:r>
-              <a:rPr lang="pt-BR" sz="2400" dirty="0" err="1"/>
-              <a:t>return</a:t>
-            </a:r>
-            <a:r>
-              <a:rPr lang="pt-BR" sz="2400" dirty="0"/>
-              <a:t> </a:t>
-            </a:r>
-            <a:r>
-              <a:rPr lang="pt-BR" sz="2400" dirty="0" err="1"/>
-              <a:t>a+b+c</a:t>
-            </a:r>
-            <a:r>
-              <a:rPr lang="pt-BR" sz="2400" dirty="0"/>
-              <a:t>;</a:t>
-            </a:r>
-          </a:p>
-          <a:p>
-            <a:r>
-              <a:rPr lang="pt-BR" sz="2400" dirty="0"/>
-              <a:t>}</a:t>
-            </a:r>
-          </a:p>
-        </p:txBody>
-      </p:sp>
     </p:spTree>
     <p:extLst>
       <p:ext uri="{BB962C8B-B14F-4D97-AF65-F5344CB8AC3E}">
-        <p14:creationId xmlns:p14="http://schemas.microsoft.com/office/powerpoint/2010/main" val="3306914633"/>
+        <p14:creationId xmlns:p14="http://schemas.microsoft.com/office/powerpoint/2010/main" val="1422606845"/>
       </p:ext>
     </p:extLst>
   </p:cSld>
@@ -10699,7 +11915,7 @@
               <a:rPr lang="pt-BR" dirty="0">
                 <a:effectLst/>
               </a:rPr>
-              <a:t>Variáveis Estáticas</a:t>
+              <a:t>Construtores</a:t>
             </a:r>
           </a:p>
         </p:txBody>
@@ -10748,7 +11964,7 @@
         <p:spPr>
           <a:xfrm>
             <a:off x="762000" y="2967335"/>
-            <a:ext cx="7086600" cy="3416320"/>
+            <a:ext cx="7086600" cy="3785652"/>
           </a:xfrm>
           <a:prstGeom prst="rect">
             <a:avLst/>
@@ -10762,30 +11978,96 @@
           <a:p>
             <a:r>
               <a:rPr lang="pt-BR" sz="2400" dirty="0"/>
-              <a:t>	Ao definirmos uma variável como estática em uma classe, ela será a mesma para todas as instâncias de um objeto.</a:t>
-            </a:r>
+              <a:t>Construtores são usados para garantir que ao instanciar um objeto, os valores dos atributos sejam preenchidos.</a:t>
+            </a:r>
+          </a:p>
+          <a:p>
+            <a:endParaRPr lang="pt-BR" sz="2400" dirty="0"/>
           </a:p>
           <a:p>
             <a:r>
               <a:rPr lang="pt-BR" sz="2400" dirty="0"/>
-              <a:t>	Ela será compartilhada e todos os objetos que acessarem essa variável estática, acessarão a mesma variável ao alterarmos o valor, ele será alterado para todas as instâncias(objetos). </a:t>
-            </a:r>
-          </a:p>
-          <a:p>
-            <a:endParaRPr lang="pt-BR" sz="2400" dirty="0"/>
-          </a:p>
-          <a:p>
+              <a:t>Ex. </a:t>
+            </a:r>
+            <a:r>
+              <a:rPr lang="pt-BR" sz="2400" dirty="0" err="1"/>
+              <a:t>public</a:t>
+            </a:r>
             <a:r>
               <a:rPr lang="pt-BR" sz="2400" dirty="0"/>
-              <a:t>Utilizamos a palavra reservada </a:t>
+              <a:t> Carro(</a:t>
             </a:r>
             <a:r>
               <a:rPr lang="pt-BR" sz="2400" dirty="0" err="1"/>
-              <a:t>static</a:t>
+              <a:t>String</a:t>
             </a:r>
             <a:r>
               <a:rPr lang="pt-BR" sz="2400" dirty="0"/>
-              <a:t>.</a:t>
+              <a:t> cor, </a:t>
+            </a:r>
+            <a:r>
+              <a:rPr lang="pt-BR" sz="2400" dirty="0" err="1"/>
+              <a:t>String</a:t>
+            </a:r>
+            <a:r>
+              <a:rPr lang="pt-BR" sz="2400" dirty="0"/>
+              <a:t> modelo, </a:t>
+            </a:r>
+            <a:r>
+              <a:rPr lang="pt-BR" sz="2400" dirty="0" err="1"/>
+              <a:t>String</a:t>
+            </a:r>
+            <a:r>
+              <a:rPr lang="pt-BR" sz="2400" dirty="0"/>
+              <a:t> segmento) {</a:t>
+            </a:r>
+          </a:p>
+          <a:p>
+            <a:r>
+              <a:rPr lang="pt-BR" sz="2400" dirty="0"/>
+              <a:t>		</a:t>
+            </a:r>
+            <a:r>
+              <a:rPr lang="pt-BR" sz="2400" dirty="0" err="1"/>
+              <a:t>this.cor</a:t>
+            </a:r>
+            <a:r>
+              <a:rPr lang="pt-BR" sz="2400" dirty="0"/>
+              <a:t> = cor;</a:t>
+            </a:r>
+          </a:p>
+          <a:p>
+            <a:r>
+              <a:rPr lang="pt-BR" sz="2400" dirty="0"/>
+              <a:t>		</a:t>
+            </a:r>
+            <a:r>
+              <a:rPr lang="pt-BR" sz="2400" dirty="0" err="1"/>
+              <a:t>this.modelo</a:t>
+            </a:r>
+            <a:r>
+              <a:rPr lang="pt-BR" sz="2400" dirty="0"/>
+              <a:t> = modelo;</a:t>
+            </a:r>
+          </a:p>
+          <a:p>
+            <a:r>
+              <a:rPr lang="pt-BR" sz="2400" dirty="0"/>
+              <a:t>		</a:t>
+            </a:r>
+            <a:r>
+              <a:rPr lang="pt-BR" sz="2400" dirty="0" err="1"/>
+              <a:t>this.segmento</a:t>
+            </a:r>
+            <a:r>
+              <a:rPr lang="pt-BR" sz="2400" dirty="0"/>
+              <a:t> = segmento;</a:t>
+            </a:r>
+          </a:p>
+          <a:p>
+            <a:r>
+              <a:rPr lang="pt-BR" sz="2400" dirty="0"/>
+              <a:t>	}</a:t>
             </a:r>
           </a:p>
         </p:txBody>
@@ -10793,7 +12075,7 @@
     </p:spTree>
     <p:extLst>
       <p:ext uri="{BB962C8B-B14F-4D97-AF65-F5344CB8AC3E}">
-        <p14:creationId xmlns:p14="http://schemas.microsoft.com/office/powerpoint/2010/main" val="1472064202"/>
+        <p14:creationId xmlns:p14="http://schemas.microsoft.com/office/powerpoint/2010/main" val="3795687807"/>
       </p:ext>
     </p:extLst>
   </p:cSld>

</xml_diff>